<commit_message>
Add Content to Slides concerning Wish-Criteria
</commit_message>
<xml_diff>
--- a/Praesentationen/01-Definitionsphase/Präsentation.pptx
+++ b/Praesentationen/01-Definitionsphase/Präsentation.pptx
@@ -5385,13 +5385,134 @@
           <a:p>
             <a:r>
               <a:rPr lang="de-DE" dirty="0"/>
-              <a:t>(90 sec)</a:t>
-            </a:r>
-          </a:p>
-          <a:p>
+              <a:t>WAS?</a:t>
+            </a:r>
+          </a:p>
+          <a:p>
+            <a:pPr marL="171450" indent="-171450">
+              <a:buFont typeface="Arial" panose="020B0604020202020204" pitchFamily="34" charset="0"/>
+              <a:buChar char="•"/>
+            </a:pPr>
             <a:r>
               <a:rPr lang="de-DE" dirty="0"/>
-              <a:t>Arne</a:t>
+              <a:t>Nutzer kann Mapping Tabelle -&gt; Graph einstellen</a:t>
+            </a:r>
+          </a:p>
+          <a:p>
+            <a:pPr marL="171450" indent="-171450">
+              <a:buFont typeface="Arial" panose="020B0604020202020204" pitchFamily="34" charset="0"/>
+              <a:buChar char="•"/>
+            </a:pPr>
+            <a:r>
+              <a:rPr lang="de-DE" dirty="0"/>
+              <a:t>Beinhaltet Spalte -&gt; Achse, aber auch Funktionen</a:t>
+            </a:r>
+          </a:p>
+          <a:p>
+            <a:pPr marL="171450" indent="-171450">
+              <a:buFont typeface="Arial" panose="020B0604020202020204" pitchFamily="34" charset="0"/>
+              <a:buChar char="•"/>
+            </a:pPr>
+            <a:endParaRPr lang="de-DE" dirty="0"/>
+          </a:p>
+          <a:p>
+            <a:pPr marL="0" indent="0">
+              <a:buFont typeface="Arial" panose="020B0604020202020204" pitchFamily="34" charset="0"/>
+              <a:buNone/>
+            </a:pPr>
+            <a:r>
+              <a:rPr lang="de-DE" dirty="0"/>
+              <a:t>WARUM?</a:t>
+            </a:r>
+          </a:p>
+          <a:p>
+            <a:pPr marL="171450" indent="-171450">
+              <a:buFont typeface="Arial" panose="020B0604020202020204" pitchFamily="34" charset="0"/>
+              <a:buChar char="•"/>
+            </a:pPr>
+            <a:r>
+              <a:rPr lang="de-DE" dirty="0"/>
+              <a:t>Neue Graphen sind u.U. nicht automatisch </a:t>
+            </a:r>
+            <a:r>
+              <a:rPr lang="de-DE" dirty="0" err="1"/>
+              <a:t>mappbar</a:t>
+            </a:r>
+            <a:endParaRPr lang="de-DE" dirty="0"/>
+          </a:p>
+          <a:p>
+            <a:pPr marL="171450" indent="-171450">
+              <a:buFont typeface="Arial" panose="020B0604020202020204" pitchFamily="34" charset="0"/>
+              <a:buChar char="•"/>
+            </a:pPr>
+            <a:r>
+              <a:rPr lang="de-DE" dirty="0"/>
+              <a:t>Neue Datentypen ebenfalls nicht</a:t>
+            </a:r>
+          </a:p>
+          <a:p>
+            <a:pPr marL="171450" indent="-171450">
+              <a:buFont typeface="Arial" panose="020B0604020202020204" pitchFamily="34" charset="0"/>
+              <a:buChar char="•"/>
+            </a:pPr>
+            <a:r>
+              <a:rPr lang="de-DE" dirty="0"/>
+              <a:t>Was, wenn ich Zeit nicht nur als X-Achse haben will?</a:t>
+            </a:r>
+          </a:p>
+          <a:p>
+            <a:pPr marL="171450" indent="-171450">
+              <a:buFont typeface="Arial" panose="020B0604020202020204" pitchFamily="34" charset="0"/>
+              <a:buChar char="•"/>
+            </a:pPr>
+            <a:r>
+              <a:rPr lang="de-DE" dirty="0"/>
+              <a:t>Automatisch schwierig (eigenes Forschungsfeld), deshalb manuell</a:t>
+            </a:r>
+          </a:p>
+          <a:p>
+            <a:pPr marL="171450" indent="-171450">
+              <a:buFont typeface="Arial" panose="020B0604020202020204" pitchFamily="34" charset="0"/>
+              <a:buChar char="•"/>
+            </a:pPr>
+            <a:endParaRPr lang="de-DE" dirty="0"/>
+          </a:p>
+          <a:p>
+            <a:pPr marL="0" indent="0">
+              <a:buFont typeface="Arial" panose="020B0604020202020204" pitchFamily="34" charset="0"/>
+              <a:buNone/>
+            </a:pPr>
+            <a:r>
+              <a:rPr lang="de-DE" dirty="0"/>
+              <a:t>WUNSCH?</a:t>
+            </a:r>
+          </a:p>
+          <a:p>
+            <a:pPr marL="171450" indent="-171450">
+              <a:buFont typeface="Arial" panose="020B0604020202020204" pitchFamily="34" charset="0"/>
+              <a:buChar char="•"/>
+            </a:pPr>
+            <a:r>
+              <a:rPr lang="de-DE" dirty="0"/>
+              <a:t>In Pflichtkriterien schlicht nicht notwendig / sinnvoll (</a:t>
+            </a:r>
+            <a:r>
+              <a:rPr lang="de-DE" dirty="0">
+                <a:sym typeface="Wingdings" panose="05000000000000000000" pitchFamily="2" charset="2"/>
+              </a:rPr>
+              <a:t>Verwirrung)</a:t>
+            </a:r>
+          </a:p>
+          <a:p>
+            <a:pPr marL="171450" indent="-171450">
+              <a:buFont typeface="Arial" panose="020B0604020202020204" pitchFamily="34" charset="0"/>
+              <a:buChar char="•"/>
+            </a:pPr>
+            <a:r>
+              <a:rPr lang="de-DE" dirty="0">
+                <a:sym typeface="Wingdings" panose="05000000000000000000" pitchFamily="2" charset="2"/>
+              </a:rPr>
+              <a:t>Aufwendige Checks, ob Datentypen überhaupt anwendbar sind für ein Diagramm</a:t>
             </a:r>
           </a:p>
         </p:txBody>
@@ -5478,8 +5599,134 @@
           <a:p>
             <a:r>
               <a:rPr lang="de-DE" dirty="0"/>
-              <a:t>(90 sec)</a:t>
-            </a:r>
+              <a:t>WAS?</a:t>
+            </a:r>
+          </a:p>
+          <a:p>
+            <a:pPr marL="171450" indent="-171450">
+              <a:buFont typeface="Arial" panose="020B0604020202020204" pitchFamily="34" charset="0"/>
+              <a:buChar char="•"/>
+            </a:pPr>
+            <a:r>
+              <a:rPr lang="de-DE" dirty="0"/>
+              <a:t>Nutzer können Templates (inkl. Bilder von Graphen) auf Server hoch- und von dort herunterladen</a:t>
+            </a:r>
+          </a:p>
+          <a:p>
+            <a:pPr marL="171450" indent="-171450">
+              <a:buFont typeface="Arial" panose="020B0604020202020204" pitchFamily="34" charset="0"/>
+              <a:buChar char="•"/>
+            </a:pPr>
+            <a:r>
+              <a:rPr lang="de-DE" dirty="0"/>
+              <a:t>Beinhaltet sowohl Projekt- als auch Einstellungstemplates</a:t>
+            </a:r>
+          </a:p>
+          <a:p>
+            <a:pPr marL="171450" indent="-171450">
+              <a:buFont typeface="Arial" panose="020B0604020202020204" pitchFamily="34" charset="0"/>
+              <a:buChar char="•"/>
+            </a:pPr>
+            <a:endParaRPr lang="de-DE" dirty="0"/>
+          </a:p>
+          <a:p>
+            <a:pPr marL="0" indent="0">
+              <a:buFont typeface="Arial" panose="020B0604020202020204" pitchFamily="34" charset="0"/>
+              <a:buNone/>
+            </a:pPr>
+            <a:r>
+              <a:rPr lang="de-DE" dirty="0"/>
+              <a:t>WARUM?</a:t>
+            </a:r>
+          </a:p>
+          <a:p>
+            <a:pPr marL="171450" indent="-171450">
+              <a:buFont typeface="Arial" panose="020B0604020202020204" pitchFamily="34" charset="0"/>
+              <a:buChar char="•"/>
+            </a:pPr>
+            <a:r>
+              <a:rPr lang="de-DE" dirty="0"/>
+              <a:t>Anschauen -&gt; Inspiration</a:t>
+            </a:r>
+          </a:p>
+          <a:p>
+            <a:pPr marL="171450" indent="-171450">
+              <a:buFont typeface="Arial" panose="020B0604020202020204" pitchFamily="34" charset="0"/>
+              <a:buChar char="•"/>
+            </a:pPr>
+            <a:r>
+              <a:rPr lang="de-DE" dirty="0"/>
+              <a:t>Coole Idee, aber keine Ahnung, wie umsetzen? Projekttemplate herunterladen</a:t>
+            </a:r>
+          </a:p>
+          <a:p>
+            <a:pPr marL="171450" indent="-171450">
+              <a:buFont typeface="Arial" panose="020B0604020202020204" pitchFamily="34" charset="0"/>
+              <a:buChar char="•"/>
+            </a:pPr>
+            <a:endParaRPr lang="de-DE" dirty="0"/>
+          </a:p>
+          <a:p>
+            <a:pPr marL="171450" indent="-171450">
+              <a:buFont typeface="Arial" panose="020B0604020202020204" pitchFamily="34" charset="0"/>
+              <a:buChar char="•"/>
+            </a:pPr>
+            <a:endParaRPr lang="de-DE" dirty="0"/>
+          </a:p>
+          <a:p>
+            <a:pPr marL="0" indent="0">
+              <a:buFont typeface="Arial" panose="020B0604020202020204" pitchFamily="34" charset="0"/>
+              <a:buNone/>
+            </a:pPr>
+            <a:r>
+              <a:rPr lang="de-DE" dirty="0"/>
+              <a:t>WUNSCH?</a:t>
+            </a:r>
+          </a:p>
+          <a:p>
+            <a:pPr marL="171450" indent="-171450">
+              <a:buFont typeface="Arial" panose="020B0604020202020204" pitchFamily="34" charset="0"/>
+              <a:buChar char="•"/>
+            </a:pPr>
+            <a:r>
+              <a:rPr lang="de-DE" dirty="0"/>
+              <a:t>Serverauslastung schwerer vorhersehbar als bei Online-Projekten</a:t>
+            </a:r>
+          </a:p>
+          <a:p>
+            <a:pPr marL="171450" indent="-171450">
+              <a:buFont typeface="Arial" panose="020B0604020202020204" pitchFamily="34" charset="0"/>
+              <a:buChar char="•"/>
+            </a:pPr>
+            <a:r>
+              <a:rPr lang="de-DE" dirty="0"/>
+              <a:t>Spam-Schutz? Wie? Ähnlichkeit? </a:t>
+            </a:r>
+            <a:r>
+              <a:rPr lang="de-DE" dirty="0">
+                <a:sym typeface="Wingdings" panose="05000000000000000000" pitchFamily="2" charset="2"/>
+              </a:rPr>
+              <a:t> Aufwendig</a:t>
+            </a:r>
+          </a:p>
+          <a:p>
+            <a:pPr marL="171450" indent="-171450">
+              <a:buFont typeface="Arial" panose="020B0604020202020204" pitchFamily="34" charset="0"/>
+              <a:buChar char="•"/>
+            </a:pPr>
+            <a:r>
+              <a:rPr lang="de-DE" dirty="0">
+                <a:sym typeface="Wingdings" panose="05000000000000000000" pitchFamily="2" charset="2"/>
+              </a:rPr>
+              <a:t>Bei Pflichtkriterien auch kein Mehrwert für Punkt 2, da nicht so aufwendige </a:t>
+            </a:r>
+            <a:r>
+              <a:rPr lang="de-DE">
+                <a:sym typeface="Wingdings" panose="05000000000000000000" pitchFamily="2" charset="2"/>
+              </a:rPr>
+              <a:t>Projekte möglich</a:t>
+            </a:r>
+            <a:endParaRPr lang="de-DE"/>
           </a:p>
         </p:txBody>
       </p:sp>
@@ -10725,31 +10972,6 @@
       </p:sp>
       <p:sp>
         <p:nvSpPr>
-          <p:cNvPr id="3" name="Inhaltsplatzhalter 2">
-            <a:extLst>
-              <a:ext uri="{FF2B5EF4-FFF2-40B4-BE49-F238E27FC236}">
-                <a16:creationId xmlns:a16="http://schemas.microsoft.com/office/drawing/2014/main" id="{4CE96944-75C4-164D-BDA5-124619DEF2B0}"/>
-              </a:ext>
-            </a:extLst>
-          </p:cNvPr>
-          <p:cNvSpPr>
-            <a:spLocks noGrp="1"/>
-          </p:cNvSpPr>
-          <p:nvPr>
-            <p:ph idx="1"/>
-          </p:nvPr>
-        </p:nvSpPr>
-        <p:spPr/>
-        <p:txBody>
-          <a:bodyPr/>
-          <a:lstStyle/>
-          <a:p>
-            <a:endParaRPr lang="de-DE"/>
-          </a:p>
-        </p:txBody>
-      </p:sp>
-      <p:sp>
-        <p:nvSpPr>
           <p:cNvPr id="4" name="Datumsplatzhalter 3">
             <a:extLst>
               <a:ext uri="{FF2B5EF4-FFF2-40B4-BE49-F238E27FC236}">
@@ -10802,6 +11024,457 @@
               <a:t>13</a:t>
             </a:fld>
             <a:endParaRPr lang="de-DE"/>
+          </a:p>
+        </p:txBody>
+      </p:sp>
+      <p:sp>
+        <p:nvSpPr>
+          <p:cNvPr id="6" name="Inhaltsplatzhalter 2">
+            <a:extLst>
+              <a:ext uri="{FF2B5EF4-FFF2-40B4-BE49-F238E27FC236}">
+                <a16:creationId xmlns:a16="http://schemas.microsoft.com/office/drawing/2014/main" id="{8A76C604-608B-4DA8-92CD-CD20B2C59395}"/>
+              </a:ext>
+            </a:extLst>
+          </p:cNvPr>
+          <p:cNvSpPr txBox="1">
+            <a:spLocks/>
+          </p:cNvSpPr>
+          <p:nvPr/>
+        </p:nvSpPr>
+        <p:spPr>
+          <a:xfrm>
+            <a:off x="838200" y="1825625"/>
+            <a:ext cx="5181600" cy="4351338"/>
+          </a:xfrm>
+          <a:prstGeom prst="rect">
+            <a:avLst/>
+          </a:prstGeom>
+        </p:spPr>
+        <p:txBody>
+          <a:bodyPr vert="horz" lIns="91440" tIns="45720" rIns="91440" bIns="45720" rtlCol="0">
+            <a:normAutofit/>
+          </a:bodyPr>
+          <a:lstStyle>
+            <a:lvl1pPr marL="228600" indent="-228600" algn="l" defTabSz="914400" rtl="0" eaLnBrk="1" latinLnBrk="0" hangingPunct="1">
+              <a:lnSpc>
+                <a:spcPct val="90000"/>
+              </a:lnSpc>
+              <a:spcBef>
+                <a:spcPts val="1000"/>
+              </a:spcBef>
+              <a:buFont typeface="Arial" panose="020B0604020202020204" pitchFamily="34" charset="0"/>
+              <a:buChar char="•"/>
+              <a:defRPr sz="2800" kern="1200">
+                <a:solidFill>
+                  <a:schemeClr val="tx1"/>
+                </a:solidFill>
+                <a:latin typeface="+mn-lt"/>
+                <a:ea typeface="+mn-ea"/>
+                <a:cs typeface="+mn-cs"/>
+              </a:defRPr>
+            </a:lvl1pPr>
+            <a:lvl2pPr marL="685800" indent="-228600" algn="l" defTabSz="914400" rtl="0" eaLnBrk="1" latinLnBrk="0" hangingPunct="1">
+              <a:lnSpc>
+                <a:spcPct val="90000"/>
+              </a:lnSpc>
+              <a:spcBef>
+                <a:spcPts val="500"/>
+              </a:spcBef>
+              <a:buFont typeface="Arial" panose="020B0604020202020204" pitchFamily="34" charset="0"/>
+              <a:buChar char="•"/>
+              <a:defRPr sz="2400" kern="1200">
+                <a:solidFill>
+                  <a:schemeClr val="tx1"/>
+                </a:solidFill>
+                <a:latin typeface="+mn-lt"/>
+                <a:ea typeface="+mn-ea"/>
+                <a:cs typeface="+mn-cs"/>
+              </a:defRPr>
+            </a:lvl2pPr>
+            <a:lvl3pPr marL="1143000" indent="-228600" algn="l" defTabSz="914400" rtl="0" eaLnBrk="1" latinLnBrk="0" hangingPunct="1">
+              <a:lnSpc>
+                <a:spcPct val="90000"/>
+              </a:lnSpc>
+              <a:spcBef>
+                <a:spcPts val="500"/>
+              </a:spcBef>
+              <a:buFont typeface="Arial" panose="020B0604020202020204" pitchFamily="34" charset="0"/>
+              <a:buChar char="•"/>
+              <a:defRPr sz="2000" kern="1200">
+                <a:solidFill>
+                  <a:schemeClr val="tx1"/>
+                </a:solidFill>
+                <a:latin typeface="+mn-lt"/>
+                <a:ea typeface="+mn-ea"/>
+                <a:cs typeface="+mn-cs"/>
+              </a:defRPr>
+            </a:lvl3pPr>
+            <a:lvl4pPr marL="1600200" indent="-228600" algn="l" defTabSz="914400" rtl="0" eaLnBrk="1" latinLnBrk="0" hangingPunct="1">
+              <a:lnSpc>
+                <a:spcPct val="90000"/>
+              </a:lnSpc>
+              <a:spcBef>
+                <a:spcPts val="500"/>
+              </a:spcBef>
+              <a:buFont typeface="Arial" panose="020B0604020202020204" pitchFamily="34" charset="0"/>
+              <a:buChar char="•"/>
+              <a:defRPr sz="1800" kern="1200">
+                <a:solidFill>
+                  <a:schemeClr val="tx1"/>
+                </a:solidFill>
+                <a:latin typeface="+mn-lt"/>
+                <a:ea typeface="+mn-ea"/>
+                <a:cs typeface="+mn-cs"/>
+              </a:defRPr>
+            </a:lvl4pPr>
+            <a:lvl5pPr marL="2057400" indent="-228600" algn="l" defTabSz="914400" rtl="0" eaLnBrk="1" latinLnBrk="0" hangingPunct="1">
+              <a:lnSpc>
+                <a:spcPct val="90000"/>
+              </a:lnSpc>
+              <a:spcBef>
+                <a:spcPts val="500"/>
+              </a:spcBef>
+              <a:buFont typeface="Arial" panose="020B0604020202020204" pitchFamily="34" charset="0"/>
+              <a:buChar char="•"/>
+              <a:defRPr sz="1800" kern="1200">
+                <a:solidFill>
+                  <a:schemeClr val="tx1"/>
+                </a:solidFill>
+                <a:latin typeface="+mn-lt"/>
+                <a:ea typeface="+mn-ea"/>
+                <a:cs typeface="+mn-cs"/>
+              </a:defRPr>
+            </a:lvl5pPr>
+            <a:lvl6pPr marL="2514600" indent="-228600" algn="l" defTabSz="914400" rtl="0" eaLnBrk="1" latinLnBrk="0" hangingPunct="1">
+              <a:lnSpc>
+                <a:spcPct val="90000"/>
+              </a:lnSpc>
+              <a:spcBef>
+                <a:spcPts val="500"/>
+              </a:spcBef>
+              <a:buFont typeface="Arial" panose="020B0604020202020204" pitchFamily="34" charset="0"/>
+              <a:buChar char="•"/>
+              <a:defRPr sz="1800" kern="1200">
+                <a:solidFill>
+                  <a:schemeClr val="tx1"/>
+                </a:solidFill>
+                <a:latin typeface="+mn-lt"/>
+                <a:ea typeface="+mn-ea"/>
+                <a:cs typeface="+mn-cs"/>
+              </a:defRPr>
+            </a:lvl6pPr>
+            <a:lvl7pPr marL="2971800" indent="-228600" algn="l" defTabSz="914400" rtl="0" eaLnBrk="1" latinLnBrk="0" hangingPunct="1">
+              <a:lnSpc>
+                <a:spcPct val="90000"/>
+              </a:lnSpc>
+              <a:spcBef>
+                <a:spcPts val="500"/>
+              </a:spcBef>
+              <a:buFont typeface="Arial" panose="020B0604020202020204" pitchFamily="34" charset="0"/>
+              <a:buChar char="•"/>
+              <a:defRPr sz="1800" kern="1200">
+                <a:solidFill>
+                  <a:schemeClr val="tx1"/>
+                </a:solidFill>
+                <a:latin typeface="+mn-lt"/>
+                <a:ea typeface="+mn-ea"/>
+                <a:cs typeface="+mn-cs"/>
+              </a:defRPr>
+            </a:lvl7pPr>
+            <a:lvl8pPr marL="3429000" indent="-228600" algn="l" defTabSz="914400" rtl="0" eaLnBrk="1" latinLnBrk="0" hangingPunct="1">
+              <a:lnSpc>
+                <a:spcPct val="90000"/>
+              </a:lnSpc>
+              <a:spcBef>
+                <a:spcPts val="500"/>
+              </a:spcBef>
+              <a:buFont typeface="Arial" panose="020B0604020202020204" pitchFamily="34" charset="0"/>
+              <a:buChar char="•"/>
+              <a:defRPr sz="1800" kern="1200">
+                <a:solidFill>
+                  <a:schemeClr val="tx1"/>
+                </a:solidFill>
+                <a:latin typeface="+mn-lt"/>
+                <a:ea typeface="+mn-ea"/>
+                <a:cs typeface="+mn-cs"/>
+              </a:defRPr>
+            </a:lvl8pPr>
+            <a:lvl9pPr marL="3886200" indent="-228600" algn="l" defTabSz="914400" rtl="0" eaLnBrk="1" latinLnBrk="0" hangingPunct="1">
+              <a:lnSpc>
+                <a:spcPct val="90000"/>
+              </a:lnSpc>
+              <a:spcBef>
+                <a:spcPts val="500"/>
+              </a:spcBef>
+              <a:buFont typeface="Arial" panose="020B0604020202020204" pitchFamily="34" charset="0"/>
+              <a:buChar char="•"/>
+              <a:defRPr sz="1800" kern="1200">
+                <a:solidFill>
+                  <a:schemeClr val="tx1"/>
+                </a:solidFill>
+                <a:latin typeface="+mn-lt"/>
+                <a:ea typeface="+mn-ea"/>
+                <a:cs typeface="+mn-cs"/>
+              </a:defRPr>
+            </a:lvl9pPr>
+          </a:lstStyle>
+          <a:p>
+            <a:pPr marL="0" indent="0">
+              <a:buFont typeface="Arial" panose="020B0604020202020204" pitchFamily="34" charset="0"/>
+              <a:buNone/>
+            </a:pPr>
+            <a:r>
+              <a:rPr lang="de-DE" i="1" dirty="0"/>
+              <a:t>Warum gewünscht: </a:t>
+            </a:r>
+          </a:p>
+          <a:p>
+            <a:pPr marL="0" indent="0">
+              <a:buFont typeface="Arial" panose="020B0604020202020204" pitchFamily="34" charset="0"/>
+              <a:buNone/>
+            </a:pPr>
+            <a:endParaRPr lang="de-DE" dirty="0"/>
+          </a:p>
+          <a:p>
+            <a:r>
+              <a:rPr lang="de-DE" dirty="0"/>
+              <a:t>Neue Graphen</a:t>
+            </a:r>
+          </a:p>
+          <a:p>
+            <a:r>
+              <a:rPr lang="de-DE" dirty="0"/>
+              <a:t>Neue Datentypen</a:t>
+            </a:r>
+          </a:p>
+          <a:p>
+            <a:r>
+              <a:rPr lang="de-DE" dirty="0"/>
+              <a:t>Andere Verwendung der existierende Graphen</a:t>
+            </a:r>
+          </a:p>
+        </p:txBody>
+      </p:sp>
+      <p:sp>
+        <p:nvSpPr>
+          <p:cNvPr id="7" name="Inhaltsplatzhalter 3">
+            <a:extLst>
+              <a:ext uri="{FF2B5EF4-FFF2-40B4-BE49-F238E27FC236}">
+                <a16:creationId xmlns:a16="http://schemas.microsoft.com/office/drawing/2014/main" id="{2809ED00-FEDA-4690-A59A-884CFB5FDA2C}"/>
+              </a:ext>
+            </a:extLst>
+          </p:cNvPr>
+          <p:cNvSpPr txBox="1">
+            <a:spLocks/>
+          </p:cNvSpPr>
+          <p:nvPr/>
+        </p:nvSpPr>
+        <p:spPr>
+          <a:xfrm>
+            <a:off x="6172200" y="1825625"/>
+            <a:ext cx="5181600" cy="4351338"/>
+          </a:xfrm>
+          <a:prstGeom prst="rect">
+            <a:avLst/>
+          </a:prstGeom>
+        </p:spPr>
+        <p:txBody>
+          <a:bodyPr/>
+          <a:lstStyle>
+            <a:lvl1pPr marL="228600" indent="-228600" algn="l" defTabSz="914400" rtl="0" eaLnBrk="1" latinLnBrk="0" hangingPunct="1">
+              <a:lnSpc>
+                <a:spcPct val="90000"/>
+              </a:lnSpc>
+              <a:spcBef>
+                <a:spcPts val="1000"/>
+              </a:spcBef>
+              <a:buFont typeface="Arial" panose="020B0604020202020204" pitchFamily="34" charset="0"/>
+              <a:buChar char="•"/>
+              <a:defRPr sz="2800" kern="1200">
+                <a:solidFill>
+                  <a:schemeClr val="tx1"/>
+                </a:solidFill>
+                <a:latin typeface="+mn-lt"/>
+                <a:ea typeface="+mn-ea"/>
+                <a:cs typeface="+mn-cs"/>
+              </a:defRPr>
+            </a:lvl1pPr>
+            <a:lvl2pPr marL="685800" indent="-228600" algn="l" defTabSz="914400" rtl="0" eaLnBrk="1" latinLnBrk="0" hangingPunct="1">
+              <a:lnSpc>
+                <a:spcPct val="90000"/>
+              </a:lnSpc>
+              <a:spcBef>
+                <a:spcPts val="500"/>
+              </a:spcBef>
+              <a:buFont typeface="Arial" panose="020B0604020202020204" pitchFamily="34" charset="0"/>
+              <a:buChar char="•"/>
+              <a:defRPr sz="2400" kern="1200">
+                <a:solidFill>
+                  <a:schemeClr val="tx1"/>
+                </a:solidFill>
+                <a:latin typeface="+mn-lt"/>
+                <a:ea typeface="+mn-ea"/>
+                <a:cs typeface="+mn-cs"/>
+              </a:defRPr>
+            </a:lvl2pPr>
+            <a:lvl3pPr marL="1143000" indent="-228600" algn="l" defTabSz="914400" rtl="0" eaLnBrk="1" latinLnBrk="0" hangingPunct="1">
+              <a:lnSpc>
+                <a:spcPct val="90000"/>
+              </a:lnSpc>
+              <a:spcBef>
+                <a:spcPts val="500"/>
+              </a:spcBef>
+              <a:buFont typeface="Arial" panose="020B0604020202020204" pitchFamily="34" charset="0"/>
+              <a:buChar char="•"/>
+              <a:defRPr sz="2000" kern="1200">
+                <a:solidFill>
+                  <a:schemeClr val="tx1"/>
+                </a:solidFill>
+                <a:latin typeface="+mn-lt"/>
+                <a:ea typeface="+mn-ea"/>
+                <a:cs typeface="+mn-cs"/>
+              </a:defRPr>
+            </a:lvl3pPr>
+            <a:lvl4pPr marL="1600200" indent="-228600" algn="l" defTabSz="914400" rtl="0" eaLnBrk="1" latinLnBrk="0" hangingPunct="1">
+              <a:lnSpc>
+                <a:spcPct val="90000"/>
+              </a:lnSpc>
+              <a:spcBef>
+                <a:spcPts val="500"/>
+              </a:spcBef>
+              <a:buFont typeface="Arial" panose="020B0604020202020204" pitchFamily="34" charset="0"/>
+              <a:buChar char="•"/>
+              <a:defRPr sz="1800" kern="1200">
+                <a:solidFill>
+                  <a:schemeClr val="tx1"/>
+                </a:solidFill>
+                <a:latin typeface="+mn-lt"/>
+                <a:ea typeface="+mn-ea"/>
+                <a:cs typeface="+mn-cs"/>
+              </a:defRPr>
+            </a:lvl4pPr>
+            <a:lvl5pPr marL="2057400" indent="-228600" algn="l" defTabSz="914400" rtl="0" eaLnBrk="1" latinLnBrk="0" hangingPunct="1">
+              <a:lnSpc>
+                <a:spcPct val="90000"/>
+              </a:lnSpc>
+              <a:spcBef>
+                <a:spcPts val="500"/>
+              </a:spcBef>
+              <a:buFont typeface="Arial" panose="020B0604020202020204" pitchFamily="34" charset="0"/>
+              <a:buChar char="•"/>
+              <a:defRPr sz="1800" kern="1200">
+                <a:solidFill>
+                  <a:schemeClr val="tx1"/>
+                </a:solidFill>
+                <a:latin typeface="+mn-lt"/>
+                <a:ea typeface="+mn-ea"/>
+                <a:cs typeface="+mn-cs"/>
+              </a:defRPr>
+            </a:lvl5pPr>
+            <a:lvl6pPr marL="2514600" indent="-228600" algn="l" defTabSz="914400" rtl="0" eaLnBrk="1" latinLnBrk="0" hangingPunct="1">
+              <a:lnSpc>
+                <a:spcPct val="90000"/>
+              </a:lnSpc>
+              <a:spcBef>
+                <a:spcPts val="500"/>
+              </a:spcBef>
+              <a:buFont typeface="Arial" panose="020B0604020202020204" pitchFamily="34" charset="0"/>
+              <a:buChar char="•"/>
+              <a:defRPr sz="1800" kern="1200">
+                <a:solidFill>
+                  <a:schemeClr val="tx1"/>
+                </a:solidFill>
+                <a:latin typeface="+mn-lt"/>
+                <a:ea typeface="+mn-ea"/>
+                <a:cs typeface="+mn-cs"/>
+              </a:defRPr>
+            </a:lvl6pPr>
+            <a:lvl7pPr marL="2971800" indent="-228600" algn="l" defTabSz="914400" rtl="0" eaLnBrk="1" latinLnBrk="0" hangingPunct="1">
+              <a:lnSpc>
+                <a:spcPct val="90000"/>
+              </a:lnSpc>
+              <a:spcBef>
+                <a:spcPts val="500"/>
+              </a:spcBef>
+              <a:buFont typeface="Arial" panose="020B0604020202020204" pitchFamily="34" charset="0"/>
+              <a:buChar char="•"/>
+              <a:defRPr sz="1800" kern="1200">
+                <a:solidFill>
+                  <a:schemeClr val="tx1"/>
+                </a:solidFill>
+                <a:latin typeface="+mn-lt"/>
+                <a:ea typeface="+mn-ea"/>
+                <a:cs typeface="+mn-cs"/>
+              </a:defRPr>
+            </a:lvl7pPr>
+            <a:lvl8pPr marL="3429000" indent="-228600" algn="l" defTabSz="914400" rtl="0" eaLnBrk="1" latinLnBrk="0" hangingPunct="1">
+              <a:lnSpc>
+                <a:spcPct val="90000"/>
+              </a:lnSpc>
+              <a:spcBef>
+                <a:spcPts val="500"/>
+              </a:spcBef>
+              <a:buFont typeface="Arial" panose="020B0604020202020204" pitchFamily="34" charset="0"/>
+              <a:buChar char="•"/>
+              <a:defRPr sz="1800" kern="1200">
+                <a:solidFill>
+                  <a:schemeClr val="tx1"/>
+                </a:solidFill>
+                <a:latin typeface="+mn-lt"/>
+                <a:ea typeface="+mn-ea"/>
+                <a:cs typeface="+mn-cs"/>
+              </a:defRPr>
+            </a:lvl8pPr>
+            <a:lvl9pPr marL="3886200" indent="-228600" algn="l" defTabSz="914400" rtl="0" eaLnBrk="1" latinLnBrk="0" hangingPunct="1">
+              <a:lnSpc>
+                <a:spcPct val="90000"/>
+              </a:lnSpc>
+              <a:spcBef>
+                <a:spcPts val="500"/>
+              </a:spcBef>
+              <a:buFont typeface="Arial" panose="020B0604020202020204" pitchFamily="34" charset="0"/>
+              <a:buChar char="•"/>
+              <a:defRPr sz="1800" kern="1200">
+                <a:solidFill>
+                  <a:schemeClr val="tx1"/>
+                </a:solidFill>
+                <a:latin typeface="+mn-lt"/>
+                <a:ea typeface="+mn-ea"/>
+                <a:cs typeface="+mn-cs"/>
+              </a:defRPr>
+            </a:lvl9pPr>
+          </a:lstStyle>
+          <a:p>
+            <a:pPr marL="0" indent="0">
+              <a:buFont typeface="Arial" panose="020B0604020202020204" pitchFamily="34" charset="0"/>
+              <a:buNone/>
+            </a:pPr>
+            <a:r>
+              <a:rPr lang="de-DE" i="1" dirty="0"/>
+              <a:t>Warum Wunsch:</a:t>
+            </a:r>
+          </a:p>
+          <a:p>
+            <a:pPr marL="0" indent="0">
+              <a:buFont typeface="Arial" panose="020B0604020202020204" pitchFamily="34" charset="0"/>
+              <a:buNone/>
+            </a:pPr>
+            <a:endParaRPr lang="de-DE" dirty="0"/>
+          </a:p>
+          <a:p>
+            <a:r>
+              <a:rPr lang="de-DE" dirty="0"/>
+              <a:t>Bei Basisdatentypen /-graphen nicht notwendig</a:t>
+            </a:r>
+          </a:p>
+          <a:p>
+            <a:r>
+              <a:rPr lang="de-DE" dirty="0"/>
+              <a:t>Teilweise aufwendige Checks notwendig</a:t>
+            </a:r>
+          </a:p>
+          <a:p>
+            <a:endParaRPr lang="de-DE" dirty="0"/>
           </a:p>
         </p:txBody>
       </p:sp>
@@ -10865,31 +11538,6 @@
       </p:sp>
       <p:sp>
         <p:nvSpPr>
-          <p:cNvPr id="3" name="Inhaltsplatzhalter 2">
-            <a:extLst>
-              <a:ext uri="{FF2B5EF4-FFF2-40B4-BE49-F238E27FC236}">
-                <a16:creationId xmlns:a16="http://schemas.microsoft.com/office/drawing/2014/main" id="{F5B1BE3E-AED5-0749-9729-7D99630D2CA2}"/>
-              </a:ext>
-            </a:extLst>
-          </p:cNvPr>
-          <p:cNvSpPr>
-            <a:spLocks noGrp="1"/>
-          </p:cNvSpPr>
-          <p:nvPr>
-            <p:ph idx="1"/>
-          </p:nvPr>
-        </p:nvSpPr>
-        <p:spPr/>
-        <p:txBody>
-          <a:bodyPr/>
-          <a:lstStyle/>
-          <a:p>
-            <a:endParaRPr lang="de-DE"/>
-          </a:p>
-        </p:txBody>
-      </p:sp>
-      <p:sp>
-        <p:nvSpPr>
           <p:cNvPr id="4" name="Datumsplatzhalter 3">
             <a:extLst>
               <a:ext uri="{FF2B5EF4-FFF2-40B4-BE49-F238E27FC236}">
@@ -10942,6 +11590,451 @@
               <a:t>14</a:t>
             </a:fld>
             <a:endParaRPr lang="de-DE"/>
+          </a:p>
+        </p:txBody>
+      </p:sp>
+      <p:sp>
+        <p:nvSpPr>
+          <p:cNvPr id="6" name="Inhaltsplatzhalter 2">
+            <a:extLst>
+              <a:ext uri="{FF2B5EF4-FFF2-40B4-BE49-F238E27FC236}">
+                <a16:creationId xmlns:a16="http://schemas.microsoft.com/office/drawing/2014/main" id="{64F14DAB-9492-48F6-9352-749778F15D15}"/>
+              </a:ext>
+            </a:extLst>
+          </p:cNvPr>
+          <p:cNvSpPr txBox="1">
+            <a:spLocks/>
+          </p:cNvSpPr>
+          <p:nvPr/>
+        </p:nvSpPr>
+        <p:spPr>
+          <a:xfrm>
+            <a:off x="838200" y="1825625"/>
+            <a:ext cx="5181600" cy="4351338"/>
+          </a:xfrm>
+          <a:prstGeom prst="rect">
+            <a:avLst/>
+          </a:prstGeom>
+        </p:spPr>
+        <p:txBody>
+          <a:bodyPr vert="horz" lIns="91440" tIns="45720" rIns="91440" bIns="45720" rtlCol="0">
+            <a:normAutofit/>
+          </a:bodyPr>
+          <a:lstStyle>
+            <a:lvl1pPr marL="228600" indent="-228600" algn="l" defTabSz="914400" rtl="0" eaLnBrk="1" latinLnBrk="0" hangingPunct="1">
+              <a:lnSpc>
+                <a:spcPct val="90000"/>
+              </a:lnSpc>
+              <a:spcBef>
+                <a:spcPts val="1000"/>
+              </a:spcBef>
+              <a:buFont typeface="Arial" panose="020B0604020202020204" pitchFamily="34" charset="0"/>
+              <a:buChar char="•"/>
+              <a:defRPr sz="2800" kern="1200">
+                <a:solidFill>
+                  <a:schemeClr val="tx1"/>
+                </a:solidFill>
+                <a:latin typeface="+mn-lt"/>
+                <a:ea typeface="+mn-ea"/>
+                <a:cs typeface="+mn-cs"/>
+              </a:defRPr>
+            </a:lvl1pPr>
+            <a:lvl2pPr marL="685800" indent="-228600" algn="l" defTabSz="914400" rtl="0" eaLnBrk="1" latinLnBrk="0" hangingPunct="1">
+              <a:lnSpc>
+                <a:spcPct val="90000"/>
+              </a:lnSpc>
+              <a:spcBef>
+                <a:spcPts val="500"/>
+              </a:spcBef>
+              <a:buFont typeface="Arial" panose="020B0604020202020204" pitchFamily="34" charset="0"/>
+              <a:buChar char="•"/>
+              <a:defRPr sz="2400" kern="1200">
+                <a:solidFill>
+                  <a:schemeClr val="tx1"/>
+                </a:solidFill>
+                <a:latin typeface="+mn-lt"/>
+                <a:ea typeface="+mn-ea"/>
+                <a:cs typeface="+mn-cs"/>
+              </a:defRPr>
+            </a:lvl2pPr>
+            <a:lvl3pPr marL="1143000" indent="-228600" algn="l" defTabSz="914400" rtl="0" eaLnBrk="1" latinLnBrk="0" hangingPunct="1">
+              <a:lnSpc>
+                <a:spcPct val="90000"/>
+              </a:lnSpc>
+              <a:spcBef>
+                <a:spcPts val="500"/>
+              </a:spcBef>
+              <a:buFont typeface="Arial" panose="020B0604020202020204" pitchFamily="34" charset="0"/>
+              <a:buChar char="•"/>
+              <a:defRPr sz="2000" kern="1200">
+                <a:solidFill>
+                  <a:schemeClr val="tx1"/>
+                </a:solidFill>
+                <a:latin typeface="+mn-lt"/>
+                <a:ea typeface="+mn-ea"/>
+                <a:cs typeface="+mn-cs"/>
+              </a:defRPr>
+            </a:lvl3pPr>
+            <a:lvl4pPr marL="1600200" indent="-228600" algn="l" defTabSz="914400" rtl="0" eaLnBrk="1" latinLnBrk="0" hangingPunct="1">
+              <a:lnSpc>
+                <a:spcPct val="90000"/>
+              </a:lnSpc>
+              <a:spcBef>
+                <a:spcPts val="500"/>
+              </a:spcBef>
+              <a:buFont typeface="Arial" panose="020B0604020202020204" pitchFamily="34" charset="0"/>
+              <a:buChar char="•"/>
+              <a:defRPr sz="1800" kern="1200">
+                <a:solidFill>
+                  <a:schemeClr val="tx1"/>
+                </a:solidFill>
+                <a:latin typeface="+mn-lt"/>
+                <a:ea typeface="+mn-ea"/>
+                <a:cs typeface="+mn-cs"/>
+              </a:defRPr>
+            </a:lvl4pPr>
+            <a:lvl5pPr marL="2057400" indent="-228600" algn="l" defTabSz="914400" rtl="0" eaLnBrk="1" latinLnBrk="0" hangingPunct="1">
+              <a:lnSpc>
+                <a:spcPct val="90000"/>
+              </a:lnSpc>
+              <a:spcBef>
+                <a:spcPts val="500"/>
+              </a:spcBef>
+              <a:buFont typeface="Arial" panose="020B0604020202020204" pitchFamily="34" charset="0"/>
+              <a:buChar char="•"/>
+              <a:defRPr sz="1800" kern="1200">
+                <a:solidFill>
+                  <a:schemeClr val="tx1"/>
+                </a:solidFill>
+                <a:latin typeface="+mn-lt"/>
+                <a:ea typeface="+mn-ea"/>
+                <a:cs typeface="+mn-cs"/>
+              </a:defRPr>
+            </a:lvl5pPr>
+            <a:lvl6pPr marL="2514600" indent="-228600" algn="l" defTabSz="914400" rtl="0" eaLnBrk="1" latinLnBrk="0" hangingPunct="1">
+              <a:lnSpc>
+                <a:spcPct val="90000"/>
+              </a:lnSpc>
+              <a:spcBef>
+                <a:spcPts val="500"/>
+              </a:spcBef>
+              <a:buFont typeface="Arial" panose="020B0604020202020204" pitchFamily="34" charset="0"/>
+              <a:buChar char="•"/>
+              <a:defRPr sz="1800" kern="1200">
+                <a:solidFill>
+                  <a:schemeClr val="tx1"/>
+                </a:solidFill>
+                <a:latin typeface="+mn-lt"/>
+                <a:ea typeface="+mn-ea"/>
+                <a:cs typeface="+mn-cs"/>
+              </a:defRPr>
+            </a:lvl6pPr>
+            <a:lvl7pPr marL="2971800" indent="-228600" algn="l" defTabSz="914400" rtl="0" eaLnBrk="1" latinLnBrk="0" hangingPunct="1">
+              <a:lnSpc>
+                <a:spcPct val="90000"/>
+              </a:lnSpc>
+              <a:spcBef>
+                <a:spcPts val="500"/>
+              </a:spcBef>
+              <a:buFont typeface="Arial" panose="020B0604020202020204" pitchFamily="34" charset="0"/>
+              <a:buChar char="•"/>
+              <a:defRPr sz="1800" kern="1200">
+                <a:solidFill>
+                  <a:schemeClr val="tx1"/>
+                </a:solidFill>
+                <a:latin typeface="+mn-lt"/>
+                <a:ea typeface="+mn-ea"/>
+                <a:cs typeface="+mn-cs"/>
+              </a:defRPr>
+            </a:lvl7pPr>
+            <a:lvl8pPr marL="3429000" indent="-228600" algn="l" defTabSz="914400" rtl="0" eaLnBrk="1" latinLnBrk="0" hangingPunct="1">
+              <a:lnSpc>
+                <a:spcPct val="90000"/>
+              </a:lnSpc>
+              <a:spcBef>
+                <a:spcPts val="500"/>
+              </a:spcBef>
+              <a:buFont typeface="Arial" panose="020B0604020202020204" pitchFamily="34" charset="0"/>
+              <a:buChar char="•"/>
+              <a:defRPr sz="1800" kern="1200">
+                <a:solidFill>
+                  <a:schemeClr val="tx1"/>
+                </a:solidFill>
+                <a:latin typeface="+mn-lt"/>
+                <a:ea typeface="+mn-ea"/>
+                <a:cs typeface="+mn-cs"/>
+              </a:defRPr>
+            </a:lvl8pPr>
+            <a:lvl9pPr marL="3886200" indent="-228600" algn="l" defTabSz="914400" rtl="0" eaLnBrk="1" latinLnBrk="0" hangingPunct="1">
+              <a:lnSpc>
+                <a:spcPct val="90000"/>
+              </a:lnSpc>
+              <a:spcBef>
+                <a:spcPts val="500"/>
+              </a:spcBef>
+              <a:buFont typeface="Arial" panose="020B0604020202020204" pitchFamily="34" charset="0"/>
+              <a:buChar char="•"/>
+              <a:defRPr sz="1800" kern="1200">
+                <a:solidFill>
+                  <a:schemeClr val="tx1"/>
+                </a:solidFill>
+                <a:latin typeface="+mn-lt"/>
+                <a:ea typeface="+mn-ea"/>
+                <a:cs typeface="+mn-cs"/>
+              </a:defRPr>
+            </a:lvl9pPr>
+          </a:lstStyle>
+          <a:p>
+            <a:pPr marL="0" indent="0">
+              <a:buFont typeface="Arial" panose="020B0604020202020204" pitchFamily="34" charset="0"/>
+              <a:buNone/>
+            </a:pPr>
+            <a:r>
+              <a:rPr lang="de-DE" i="1" dirty="0"/>
+              <a:t>Warum gewünscht: </a:t>
+            </a:r>
+          </a:p>
+          <a:p>
+            <a:pPr marL="0" indent="0">
+              <a:buFont typeface="Arial" panose="020B0604020202020204" pitchFamily="34" charset="0"/>
+              <a:buNone/>
+            </a:pPr>
+            <a:endParaRPr lang="de-DE" dirty="0"/>
+          </a:p>
+          <a:p>
+            <a:r>
+              <a:rPr lang="de-DE" dirty="0"/>
+              <a:t>Inspiration für Projekte von anderen Nutzern</a:t>
+            </a:r>
+          </a:p>
+          <a:p>
+            <a:r>
+              <a:rPr lang="de-DE" dirty="0"/>
+              <a:t>Einfache Möglichkeit, aufwendigere Projekte zu starten</a:t>
+            </a:r>
+          </a:p>
+        </p:txBody>
+      </p:sp>
+      <p:sp>
+        <p:nvSpPr>
+          <p:cNvPr id="7" name="Inhaltsplatzhalter 3">
+            <a:extLst>
+              <a:ext uri="{FF2B5EF4-FFF2-40B4-BE49-F238E27FC236}">
+                <a16:creationId xmlns:a16="http://schemas.microsoft.com/office/drawing/2014/main" id="{52C3776E-0D32-4519-8F17-3FCD3E951196}"/>
+              </a:ext>
+            </a:extLst>
+          </p:cNvPr>
+          <p:cNvSpPr txBox="1">
+            <a:spLocks/>
+          </p:cNvSpPr>
+          <p:nvPr/>
+        </p:nvSpPr>
+        <p:spPr>
+          <a:xfrm>
+            <a:off x="6172200" y="1825625"/>
+            <a:ext cx="5181600" cy="4351338"/>
+          </a:xfrm>
+          <a:prstGeom prst="rect">
+            <a:avLst/>
+          </a:prstGeom>
+        </p:spPr>
+        <p:txBody>
+          <a:bodyPr/>
+          <a:lstStyle>
+            <a:lvl1pPr marL="228600" indent="-228600" algn="l" defTabSz="914400" rtl="0" eaLnBrk="1" latinLnBrk="0" hangingPunct="1">
+              <a:lnSpc>
+                <a:spcPct val="90000"/>
+              </a:lnSpc>
+              <a:spcBef>
+                <a:spcPts val="1000"/>
+              </a:spcBef>
+              <a:buFont typeface="Arial" panose="020B0604020202020204" pitchFamily="34" charset="0"/>
+              <a:buChar char="•"/>
+              <a:defRPr sz="2800" kern="1200">
+                <a:solidFill>
+                  <a:schemeClr val="tx1"/>
+                </a:solidFill>
+                <a:latin typeface="+mn-lt"/>
+                <a:ea typeface="+mn-ea"/>
+                <a:cs typeface="+mn-cs"/>
+              </a:defRPr>
+            </a:lvl1pPr>
+            <a:lvl2pPr marL="685800" indent="-228600" algn="l" defTabSz="914400" rtl="0" eaLnBrk="1" latinLnBrk="0" hangingPunct="1">
+              <a:lnSpc>
+                <a:spcPct val="90000"/>
+              </a:lnSpc>
+              <a:spcBef>
+                <a:spcPts val="500"/>
+              </a:spcBef>
+              <a:buFont typeface="Arial" panose="020B0604020202020204" pitchFamily="34" charset="0"/>
+              <a:buChar char="•"/>
+              <a:defRPr sz="2400" kern="1200">
+                <a:solidFill>
+                  <a:schemeClr val="tx1"/>
+                </a:solidFill>
+                <a:latin typeface="+mn-lt"/>
+                <a:ea typeface="+mn-ea"/>
+                <a:cs typeface="+mn-cs"/>
+              </a:defRPr>
+            </a:lvl2pPr>
+            <a:lvl3pPr marL="1143000" indent="-228600" algn="l" defTabSz="914400" rtl="0" eaLnBrk="1" latinLnBrk="0" hangingPunct="1">
+              <a:lnSpc>
+                <a:spcPct val="90000"/>
+              </a:lnSpc>
+              <a:spcBef>
+                <a:spcPts val="500"/>
+              </a:spcBef>
+              <a:buFont typeface="Arial" panose="020B0604020202020204" pitchFamily="34" charset="0"/>
+              <a:buChar char="•"/>
+              <a:defRPr sz="2000" kern="1200">
+                <a:solidFill>
+                  <a:schemeClr val="tx1"/>
+                </a:solidFill>
+                <a:latin typeface="+mn-lt"/>
+                <a:ea typeface="+mn-ea"/>
+                <a:cs typeface="+mn-cs"/>
+              </a:defRPr>
+            </a:lvl3pPr>
+            <a:lvl4pPr marL="1600200" indent="-228600" algn="l" defTabSz="914400" rtl="0" eaLnBrk="1" latinLnBrk="0" hangingPunct="1">
+              <a:lnSpc>
+                <a:spcPct val="90000"/>
+              </a:lnSpc>
+              <a:spcBef>
+                <a:spcPts val="500"/>
+              </a:spcBef>
+              <a:buFont typeface="Arial" panose="020B0604020202020204" pitchFamily="34" charset="0"/>
+              <a:buChar char="•"/>
+              <a:defRPr sz="1800" kern="1200">
+                <a:solidFill>
+                  <a:schemeClr val="tx1"/>
+                </a:solidFill>
+                <a:latin typeface="+mn-lt"/>
+                <a:ea typeface="+mn-ea"/>
+                <a:cs typeface="+mn-cs"/>
+              </a:defRPr>
+            </a:lvl4pPr>
+            <a:lvl5pPr marL="2057400" indent="-228600" algn="l" defTabSz="914400" rtl="0" eaLnBrk="1" latinLnBrk="0" hangingPunct="1">
+              <a:lnSpc>
+                <a:spcPct val="90000"/>
+              </a:lnSpc>
+              <a:spcBef>
+                <a:spcPts val="500"/>
+              </a:spcBef>
+              <a:buFont typeface="Arial" panose="020B0604020202020204" pitchFamily="34" charset="0"/>
+              <a:buChar char="•"/>
+              <a:defRPr sz="1800" kern="1200">
+                <a:solidFill>
+                  <a:schemeClr val="tx1"/>
+                </a:solidFill>
+                <a:latin typeface="+mn-lt"/>
+                <a:ea typeface="+mn-ea"/>
+                <a:cs typeface="+mn-cs"/>
+              </a:defRPr>
+            </a:lvl5pPr>
+            <a:lvl6pPr marL="2514600" indent="-228600" algn="l" defTabSz="914400" rtl="0" eaLnBrk="1" latinLnBrk="0" hangingPunct="1">
+              <a:lnSpc>
+                <a:spcPct val="90000"/>
+              </a:lnSpc>
+              <a:spcBef>
+                <a:spcPts val="500"/>
+              </a:spcBef>
+              <a:buFont typeface="Arial" panose="020B0604020202020204" pitchFamily="34" charset="0"/>
+              <a:buChar char="•"/>
+              <a:defRPr sz="1800" kern="1200">
+                <a:solidFill>
+                  <a:schemeClr val="tx1"/>
+                </a:solidFill>
+                <a:latin typeface="+mn-lt"/>
+                <a:ea typeface="+mn-ea"/>
+                <a:cs typeface="+mn-cs"/>
+              </a:defRPr>
+            </a:lvl6pPr>
+            <a:lvl7pPr marL="2971800" indent="-228600" algn="l" defTabSz="914400" rtl="0" eaLnBrk="1" latinLnBrk="0" hangingPunct="1">
+              <a:lnSpc>
+                <a:spcPct val="90000"/>
+              </a:lnSpc>
+              <a:spcBef>
+                <a:spcPts val="500"/>
+              </a:spcBef>
+              <a:buFont typeface="Arial" panose="020B0604020202020204" pitchFamily="34" charset="0"/>
+              <a:buChar char="•"/>
+              <a:defRPr sz="1800" kern="1200">
+                <a:solidFill>
+                  <a:schemeClr val="tx1"/>
+                </a:solidFill>
+                <a:latin typeface="+mn-lt"/>
+                <a:ea typeface="+mn-ea"/>
+                <a:cs typeface="+mn-cs"/>
+              </a:defRPr>
+            </a:lvl7pPr>
+            <a:lvl8pPr marL="3429000" indent="-228600" algn="l" defTabSz="914400" rtl="0" eaLnBrk="1" latinLnBrk="0" hangingPunct="1">
+              <a:lnSpc>
+                <a:spcPct val="90000"/>
+              </a:lnSpc>
+              <a:spcBef>
+                <a:spcPts val="500"/>
+              </a:spcBef>
+              <a:buFont typeface="Arial" panose="020B0604020202020204" pitchFamily="34" charset="0"/>
+              <a:buChar char="•"/>
+              <a:defRPr sz="1800" kern="1200">
+                <a:solidFill>
+                  <a:schemeClr val="tx1"/>
+                </a:solidFill>
+                <a:latin typeface="+mn-lt"/>
+                <a:ea typeface="+mn-ea"/>
+                <a:cs typeface="+mn-cs"/>
+              </a:defRPr>
+            </a:lvl8pPr>
+            <a:lvl9pPr marL="3886200" indent="-228600" algn="l" defTabSz="914400" rtl="0" eaLnBrk="1" latinLnBrk="0" hangingPunct="1">
+              <a:lnSpc>
+                <a:spcPct val="90000"/>
+              </a:lnSpc>
+              <a:spcBef>
+                <a:spcPts val="500"/>
+              </a:spcBef>
+              <a:buFont typeface="Arial" panose="020B0604020202020204" pitchFamily="34" charset="0"/>
+              <a:buChar char="•"/>
+              <a:defRPr sz="1800" kern="1200">
+                <a:solidFill>
+                  <a:schemeClr val="tx1"/>
+                </a:solidFill>
+                <a:latin typeface="+mn-lt"/>
+                <a:ea typeface="+mn-ea"/>
+                <a:cs typeface="+mn-cs"/>
+              </a:defRPr>
+            </a:lvl9pPr>
+          </a:lstStyle>
+          <a:p>
+            <a:pPr marL="0" indent="0">
+              <a:buFont typeface="Arial" panose="020B0604020202020204" pitchFamily="34" charset="0"/>
+              <a:buNone/>
+            </a:pPr>
+            <a:r>
+              <a:rPr lang="de-DE" i="1" dirty="0"/>
+              <a:t>Warum Wunsch:</a:t>
+            </a:r>
+          </a:p>
+          <a:p>
+            <a:pPr marL="0" indent="0">
+              <a:buFont typeface="Arial" panose="020B0604020202020204" pitchFamily="34" charset="0"/>
+              <a:buNone/>
+            </a:pPr>
+            <a:endParaRPr lang="de-DE" dirty="0"/>
+          </a:p>
+          <a:p>
+            <a:r>
+              <a:rPr lang="de-DE" dirty="0"/>
+              <a:t>Deutlich schwieriger einschätzbare Serverauslastung</a:t>
+            </a:r>
+          </a:p>
+          <a:p>
+            <a:r>
+              <a:rPr lang="de-DE" dirty="0"/>
+              <a:t>Kein Mehrwert bei Basisdatentypen /-graphen</a:t>
+            </a:r>
+          </a:p>
+          <a:p>
+            <a:endParaRPr lang="de-DE" dirty="0"/>
           </a:p>
         </p:txBody>
       </p:sp>
@@ -12779,13 +13872,13 @@
   <p:clrMapOvr>
     <a:masterClrMapping/>
   </p:clrMapOvr>
-  <mc:AlternateContent xmlns:mc="http://schemas.openxmlformats.org/markup-compatibility/2006">
-    <mc:Choice xmlns:p14="http://schemas.microsoft.com/office/powerpoint/2010/main" Requires="p14">
+  <mc:AlternateContent xmlns:mc="http://schemas.openxmlformats.org/markup-compatibility/2006" xmlns:p14="http://schemas.microsoft.com/office/powerpoint/2010/main">
+    <mc:Choice Requires="p14">
       <p:transition p14:dur="250">
         <p:fade/>
       </p:transition>
     </mc:Choice>
-    <mc:Fallback>
+    <mc:Fallback xmlns="">
       <p:transition>
         <p:fade/>
       </p:transition>

</xml_diff>

<commit_message>
Minor changes to phrasing
</commit_message>
<xml_diff>
--- a/Praesentationen/01-Definitionsphase/Präsentation.pptx
+++ b/Praesentationen/01-Definitionsphase/Präsentation.pptx
@@ -18,10 +18,10 @@
     <p:sldId id="261" r:id="rId9"/>
     <p:sldId id="262" r:id="rId10"/>
     <p:sldId id="263" r:id="rId11"/>
-    <p:sldId id="268" r:id="rId12"/>
-    <p:sldId id="270" r:id="rId13"/>
-    <p:sldId id="265" r:id="rId14"/>
-    <p:sldId id="266" r:id="rId15"/>
+    <p:sldId id="266" r:id="rId12"/>
+    <p:sldId id="268" r:id="rId13"/>
+    <p:sldId id="270" r:id="rId14"/>
+    <p:sldId id="265" r:id="rId15"/>
     <p:sldId id="269" r:id="rId16"/>
   </p:sldIdLst>
   <p:sldSz cx="12192000" cy="6858000"/>
@@ -5062,53 +5062,134 @@
           <a:p>
             <a:r>
               <a:rPr lang="de-DE" dirty="0"/>
-              <a:t>Alice </a:t>
-            </a:r>
-            <a:r>
-              <a:rPr lang="de-DE" dirty="0" err="1"/>
-              <a:t>einzelprojekt</a:t>
-            </a:r>
+              <a:t>WAS?</a:t>
+            </a:r>
+          </a:p>
+          <a:p>
+            <a:pPr marL="171450" indent="-171450">
+              <a:buFont typeface="Arial" panose="020B0604020202020204" pitchFamily="34" charset="0"/>
+              <a:buChar char="•"/>
+            </a:pPr>
             <a:r>
               <a:rPr lang="de-DE" dirty="0"/>
-              <a:t>:</a:t>
-            </a:r>
-          </a:p>
-          <a:p>
+              <a:t>Nutzer können Templates (inkl. Bilder von Graphen) auf Server hoch- und von dort herunterladen</a:t>
+            </a:r>
+          </a:p>
+          <a:p>
+            <a:pPr marL="171450" indent="-171450">
+              <a:buFont typeface="Arial" panose="020B0604020202020204" pitchFamily="34" charset="0"/>
+              <a:buChar char="•"/>
+            </a:pPr>
             <a:r>
               <a:rPr lang="de-DE" dirty="0"/>
-              <a:t>Idee: Auch wissen wie viel Cola sie trinkt, gern auch im vergleich zum Kaffee</a:t>
-            </a:r>
-          </a:p>
-          <a:p>
+              <a:t>Beinhaltet sowohl Projekt- als auch Einstellungstemplates</a:t>
+            </a:r>
+          </a:p>
+          <a:p>
+            <a:pPr marL="171450" indent="-171450">
+              <a:buFont typeface="Arial" panose="020B0604020202020204" pitchFamily="34" charset="0"/>
+              <a:buChar char="•"/>
+            </a:pPr>
             <a:endParaRPr lang="de-DE" dirty="0"/>
           </a:p>
           <a:p>
+            <a:pPr marL="0" indent="0">
+              <a:buFont typeface="Arial" panose="020B0604020202020204" pitchFamily="34" charset="0"/>
+              <a:buNone/>
+            </a:pPr>
             <a:r>
               <a:rPr lang="de-DE" dirty="0"/>
-              <a:t>-&gt; </a:t>
-            </a:r>
-            <a:r>
-              <a:rPr lang="de-DE" dirty="0" err="1"/>
-              <a:t>möglichkeit</a:t>
-            </a:r>
+              <a:t>WARUM?</a:t>
+            </a:r>
+          </a:p>
+          <a:p>
+            <a:pPr marL="171450" indent="-171450">
+              <a:buFont typeface="Arial" panose="020B0604020202020204" pitchFamily="34" charset="0"/>
+              <a:buChar char="•"/>
+            </a:pPr>
             <a:r>
               <a:rPr lang="de-DE" dirty="0"/>
-              <a:t> </a:t>
-            </a:r>
-            <a:r>
-              <a:rPr lang="de-DE"/>
-              <a:t>das hinzuzufügen? </a:t>
-            </a:r>
+              <a:t>Anschauen -&gt; Inspiration</a:t>
+            </a:r>
+          </a:p>
+          <a:p>
+            <a:pPr marL="171450" indent="-171450">
+              <a:buFont typeface="Arial" panose="020B0604020202020204" pitchFamily="34" charset="0"/>
+              <a:buChar char="•"/>
+            </a:pPr>
+            <a:r>
+              <a:rPr lang="de-DE" dirty="0"/>
+              <a:t>Coole Idee, aber keine Ahnung, wie umsetzen? Projekttemplate herunterladen</a:t>
+            </a:r>
+          </a:p>
+          <a:p>
+            <a:pPr marL="171450" indent="-171450">
+              <a:buFont typeface="Arial" panose="020B0604020202020204" pitchFamily="34" charset="0"/>
+              <a:buChar char="•"/>
+            </a:pPr>
             <a:endParaRPr lang="de-DE" dirty="0"/>
           </a:p>
           <a:p>
+            <a:pPr marL="171450" indent="-171450">
+              <a:buFont typeface="Arial" panose="020B0604020202020204" pitchFamily="34" charset="0"/>
+              <a:buChar char="•"/>
+            </a:pPr>
             <a:endParaRPr lang="de-DE" dirty="0"/>
           </a:p>
           <a:p>
+            <a:pPr marL="0" indent="0">
+              <a:buFont typeface="Arial" panose="020B0604020202020204" pitchFamily="34" charset="0"/>
+              <a:buNone/>
+            </a:pPr>
             <a:r>
               <a:rPr lang="de-DE" dirty="0"/>
-              <a:t>Antonia</a:t>
-            </a:r>
+              <a:t>WUNSCH?</a:t>
+            </a:r>
+          </a:p>
+          <a:p>
+            <a:pPr marL="171450" indent="-171450">
+              <a:buFont typeface="Arial" panose="020B0604020202020204" pitchFamily="34" charset="0"/>
+              <a:buChar char="•"/>
+            </a:pPr>
+            <a:r>
+              <a:rPr lang="de-DE" dirty="0"/>
+              <a:t>Serverauslastung schwerer vorhersehbar als bei Online-Projekten</a:t>
+            </a:r>
+          </a:p>
+          <a:p>
+            <a:pPr marL="171450" indent="-171450">
+              <a:buFont typeface="Arial" panose="020B0604020202020204" pitchFamily="34" charset="0"/>
+              <a:buChar char="•"/>
+            </a:pPr>
+            <a:r>
+              <a:rPr lang="de-DE" dirty="0"/>
+              <a:t>Spam-Schutz? Wie? Ähnlichkeit? </a:t>
+            </a:r>
+            <a:r>
+              <a:rPr lang="de-DE" dirty="0">
+                <a:sym typeface="Wingdings" panose="05000000000000000000" pitchFamily="2" charset="2"/>
+              </a:rPr>
+              <a:t> Aufwendig</a:t>
+            </a:r>
+          </a:p>
+          <a:p>
+            <a:pPr marL="171450" indent="-171450">
+              <a:buFont typeface="Arial" panose="020B0604020202020204" pitchFamily="34" charset="0"/>
+              <a:buChar char="•"/>
+            </a:pPr>
+            <a:r>
+              <a:rPr lang="de-DE" dirty="0">
+                <a:sym typeface="Wingdings" panose="05000000000000000000" pitchFamily="2" charset="2"/>
+              </a:rPr>
+              <a:t>Bei Pflichtkriterien auch kein Mehrwert für Punkt 2, da nicht so aufwendige </a:t>
+            </a:r>
+            <a:r>
+              <a:rPr lang="de-DE">
+                <a:sym typeface="Wingdings" panose="05000000000000000000" pitchFamily="2" charset="2"/>
+              </a:rPr>
+              <a:t>Projekte möglich</a:t>
+            </a:r>
+            <a:endParaRPr lang="de-DE"/>
           </a:p>
         </p:txBody>
       </p:sp>
@@ -5138,7 +5219,7 @@
     </p:spTree>
     <p:extLst>
       <p:ext uri="{BB962C8B-B14F-4D97-AF65-F5344CB8AC3E}">
-        <p14:creationId xmlns:p14="http://schemas.microsoft.com/office/powerpoint/2010/main" val="1158242524"/>
+        <p14:creationId xmlns:p14="http://schemas.microsoft.com/office/powerpoint/2010/main" val="4235440513"/>
       </p:ext>
     </p:extLst>
   </p:cSld>
@@ -5194,112 +5275,53 @@
           <a:p>
             <a:r>
               <a:rPr lang="de-DE" dirty="0"/>
+              <a:t>Alice </a:t>
+            </a:r>
+            <a:r>
+              <a:rPr lang="de-DE" dirty="0" err="1"/>
+              <a:t>einzelprojekt</a:t>
+            </a:r>
+            <a:r>
+              <a:rPr lang="de-DE" dirty="0"/>
+              <a:t>:</a:t>
+            </a:r>
+          </a:p>
+          <a:p>
+            <a:r>
+              <a:rPr lang="de-DE" dirty="0"/>
+              <a:t>Idee: Auch wissen wie viel Cola sie trinkt, gern auch im vergleich zum Kaffee</a:t>
+            </a:r>
+          </a:p>
+          <a:p>
+            <a:endParaRPr lang="de-DE" dirty="0"/>
+          </a:p>
+          <a:p>
+            <a:r>
+              <a:rPr lang="de-DE" dirty="0"/>
+              <a:t>-&gt; </a:t>
+            </a:r>
+            <a:r>
+              <a:rPr lang="de-DE" dirty="0" err="1"/>
+              <a:t>möglichkeit</a:t>
+            </a:r>
+            <a:r>
+              <a:rPr lang="de-DE" dirty="0"/>
+              <a:t> </a:t>
+            </a:r>
+            <a:r>
+              <a:rPr lang="de-DE"/>
+              <a:t>das hinzuzufügen? </a:t>
+            </a:r>
+            <a:endParaRPr lang="de-DE" dirty="0"/>
+          </a:p>
+          <a:p>
+            <a:endParaRPr lang="de-DE" dirty="0"/>
+          </a:p>
+          <a:p>
+            <a:r>
+              <a:rPr lang="de-DE" dirty="0"/>
               <a:t>Antonia</a:t>
             </a:r>
-          </a:p>
-          <a:p>
-            <a:r>
-              <a:rPr lang="de-DE" dirty="0"/>
-              <a:t>(90 sec)</a:t>
-            </a:r>
-          </a:p>
-          <a:p>
-            <a:r>
-              <a:rPr lang="de-DE" dirty="0"/>
-              <a:t>Coole Idee:</a:t>
-            </a:r>
-          </a:p>
-          <a:p>
-            <a:r>
-              <a:rPr lang="de-DE" dirty="0"/>
-              <a:t>Zeilen &amp; Spalten hinzufügen</a:t>
-            </a:r>
-          </a:p>
-          <a:p>
-            <a:r>
-              <a:rPr lang="de-DE" dirty="0"/>
-              <a:t>Neue Ideen der Nutzenden umsetzbar</a:t>
-            </a:r>
-          </a:p>
-          <a:p>
-            <a:r>
-              <a:rPr lang="de-DE" dirty="0"/>
-              <a:t>Korrekturmöglichkeiten von ganz alten Daten</a:t>
-            </a:r>
-          </a:p>
-          <a:p>
-            <a:r>
-              <a:rPr lang="de-DE" dirty="0"/>
-              <a:t>Muss nicht alles neu gemacht werden</a:t>
-            </a:r>
-          </a:p>
-          <a:p>
-            <a:endParaRPr lang="de-DE" dirty="0"/>
-          </a:p>
-          <a:p>
-            <a:endParaRPr lang="de-DE" dirty="0"/>
-          </a:p>
-          <a:p>
-            <a:endParaRPr lang="de-DE" dirty="0"/>
-          </a:p>
-          <a:p>
-            <a:pPr marL="171450" indent="-171450">
-              <a:buFontTx/>
-              <a:buChar char="-"/>
-            </a:pPr>
-            <a:r>
-              <a:rPr lang="de-DE" dirty="0"/>
-              <a:t>Hohes Konfliktpotential durch Spalten und Zeilen hinzufügen</a:t>
-            </a:r>
-          </a:p>
-          <a:p>
-            <a:pPr marL="171450" indent="-171450">
-              <a:buFontTx/>
-              <a:buChar char="-"/>
-            </a:pPr>
-            <a:r>
-              <a:rPr lang="de-DE" dirty="0"/>
-              <a:t>Hilft der </a:t>
-            </a:r>
-            <a:r>
-              <a:rPr lang="de-DE" dirty="0" err="1"/>
-              <a:t>Intuitivität</a:t>
-            </a:r>
-            <a:r>
-              <a:rPr lang="de-DE" dirty="0"/>
-              <a:t> nicht</a:t>
-            </a:r>
-          </a:p>
-          <a:p>
-            <a:pPr marL="171450" indent="-171450">
-              <a:buFontTx/>
-              <a:buChar char="-"/>
-            </a:pPr>
-            <a:r>
-              <a:rPr lang="de-DE" dirty="0"/>
-              <a:t>Bringt noch nicht so einen großen </a:t>
-            </a:r>
-            <a:r>
-              <a:rPr lang="de-DE" dirty="0" err="1"/>
-              <a:t>mehrwert</a:t>
-            </a:r>
-            <a:r>
-              <a:rPr lang="de-DE" dirty="0"/>
-              <a:t>, da noch wenig Graphen und die Projekte generell noch nicht so komplex. </a:t>
-            </a:r>
-          </a:p>
-          <a:p>
-            <a:pPr marL="171450" indent="-171450">
-              <a:buFontTx/>
-              <a:buChar char="-"/>
-            </a:pPr>
-            <a:r>
-              <a:rPr lang="de-DE" dirty="0"/>
-              <a:t>Schöne Funktion aber eher weitergehend</a:t>
-            </a:r>
-          </a:p>
-          <a:p>
-            <a:endParaRPr lang="de-DE" dirty="0"/>
           </a:p>
         </p:txBody>
       </p:sp>
@@ -5329,7 +5351,7 @@
     </p:spTree>
     <p:extLst>
       <p:ext uri="{BB962C8B-B14F-4D97-AF65-F5344CB8AC3E}">
-        <p14:creationId xmlns:p14="http://schemas.microsoft.com/office/powerpoint/2010/main" val="2293199994"/>
+        <p14:creationId xmlns:p14="http://schemas.microsoft.com/office/powerpoint/2010/main" val="1158242524"/>
       </p:ext>
     </p:extLst>
   </p:cSld>
@@ -5385,135 +5407,112 @@
           <a:p>
             <a:r>
               <a:rPr lang="de-DE" dirty="0"/>
-              <a:t>WAS?</a:t>
-            </a:r>
+              <a:t>Antonia</a:t>
+            </a:r>
+          </a:p>
+          <a:p>
+            <a:r>
+              <a:rPr lang="de-DE" dirty="0"/>
+              <a:t>(90 sec)</a:t>
+            </a:r>
+          </a:p>
+          <a:p>
+            <a:r>
+              <a:rPr lang="de-DE" dirty="0"/>
+              <a:t>Coole Idee:</a:t>
+            </a:r>
+          </a:p>
+          <a:p>
+            <a:r>
+              <a:rPr lang="de-DE" dirty="0"/>
+              <a:t>Zeilen &amp; Spalten hinzufügen</a:t>
+            </a:r>
+          </a:p>
+          <a:p>
+            <a:r>
+              <a:rPr lang="de-DE" dirty="0"/>
+              <a:t>Neue Ideen der Nutzenden umsetzbar</a:t>
+            </a:r>
+          </a:p>
+          <a:p>
+            <a:r>
+              <a:rPr lang="de-DE" dirty="0"/>
+              <a:t>Korrekturmöglichkeiten von ganz alten Daten</a:t>
+            </a:r>
+          </a:p>
+          <a:p>
+            <a:r>
+              <a:rPr lang="de-DE" dirty="0"/>
+              <a:t>Muss nicht alles neu gemacht werden</a:t>
+            </a:r>
+          </a:p>
+          <a:p>
+            <a:endParaRPr lang="de-DE" dirty="0"/>
+          </a:p>
+          <a:p>
+            <a:endParaRPr lang="de-DE" dirty="0"/>
+          </a:p>
+          <a:p>
+            <a:endParaRPr lang="de-DE" dirty="0"/>
           </a:p>
           <a:p>
             <a:pPr marL="171450" indent="-171450">
-              <a:buFont typeface="Arial" panose="020B0604020202020204" pitchFamily="34" charset="0"/>
-              <a:buChar char="•"/>
+              <a:buFontTx/>
+              <a:buChar char="-"/>
             </a:pPr>
             <a:r>
               <a:rPr lang="de-DE" dirty="0"/>
-              <a:t>Nutzer kann Mapping Tabelle -&gt; Graph einstellen</a:t>
+              <a:t>Hohes Konfliktpotential durch Spalten und Zeilen hinzufügen</a:t>
             </a:r>
           </a:p>
           <a:p>
             <a:pPr marL="171450" indent="-171450">
-              <a:buFont typeface="Arial" panose="020B0604020202020204" pitchFamily="34" charset="0"/>
-              <a:buChar char="•"/>
+              <a:buFontTx/>
+              <a:buChar char="-"/>
             </a:pPr>
             <a:r>
               <a:rPr lang="de-DE" dirty="0"/>
-              <a:t>Beinhaltet Spalte -&gt; Achse, aber auch Funktionen</a:t>
+              <a:t>Hilft der </a:t>
+            </a:r>
+            <a:r>
+              <a:rPr lang="de-DE" dirty="0" err="1"/>
+              <a:t>Intuitivität</a:t>
+            </a:r>
+            <a:r>
+              <a:rPr lang="de-DE" dirty="0"/>
+              <a:t> nicht</a:t>
             </a:r>
           </a:p>
           <a:p>
             <a:pPr marL="171450" indent="-171450">
-              <a:buFont typeface="Arial" panose="020B0604020202020204" pitchFamily="34" charset="0"/>
-              <a:buChar char="•"/>
+              <a:buFontTx/>
+              <a:buChar char="-"/>
             </a:pPr>
+            <a:r>
+              <a:rPr lang="de-DE" dirty="0"/>
+              <a:t>Bringt noch nicht so einen großen </a:t>
+            </a:r>
+            <a:r>
+              <a:rPr lang="de-DE" dirty="0" err="1"/>
+              <a:t>mehrwert</a:t>
+            </a:r>
+            <a:r>
+              <a:rPr lang="de-DE" dirty="0"/>
+              <a:t>, da noch wenig Graphen und die Projekte generell noch nicht so komplex. </a:t>
+            </a:r>
+          </a:p>
+          <a:p>
+            <a:pPr marL="171450" indent="-171450">
+              <a:buFontTx/>
+              <a:buChar char="-"/>
+            </a:pPr>
+            <a:r>
+              <a:rPr lang="de-DE" dirty="0"/>
+              <a:t>Schöne Funktion aber eher weitergehend</a:t>
+            </a:r>
+          </a:p>
+          <a:p>
             <a:endParaRPr lang="de-DE" dirty="0"/>
-          </a:p>
-          <a:p>
-            <a:pPr marL="0" indent="0">
-              <a:buFont typeface="Arial" panose="020B0604020202020204" pitchFamily="34" charset="0"/>
-              <a:buNone/>
-            </a:pPr>
-            <a:r>
-              <a:rPr lang="de-DE" dirty="0"/>
-              <a:t>WARUM?</a:t>
-            </a:r>
-          </a:p>
-          <a:p>
-            <a:pPr marL="171450" indent="-171450">
-              <a:buFont typeface="Arial" panose="020B0604020202020204" pitchFamily="34" charset="0"/>
-              <a:buChar char="•"/>
-            </a:pPr>
-            <a:r>
-              <a:rPr lang="de-DE" dirty="0"/>
-              <a:t>Neue Graphen sind u.U. nicht automatisch </a:t>
-            </a:r>
-            <a:r>
-              <a:rPr lang="de-DE" dirty="0" err="1"/>
-              <a:t>mappbar</a:t>
-            </a:r>
-            <a:endParaRPr lang="de-DE" dirty="0"/>
-          </a:p>
-          <a:p>
-            <a:pPr marL="171450" indent="-171450">
-              <a:buFont typeface="Arial" panose="020B0604020202020204" pitchFamily="34" charset="0"/>
-              <a:buChar char="•"/>
-            </a:pPr>
-            <a:r>
-              <a:rPr lang="de-DE" dirty="0"/>
-              <a:t>Neue Datentypen ebenfalls nicht</a:t>
-            </a:r>
-          </a:p>
-          <a:p>
-            <a:pPr marL="171450" indent="-171450">
-              <a:buFont typeface="Arial" panose="020B0604020202020204" pitchFamily="34" charset="0"/>
-              <a:buChar char="•"/>
-            </a:pPr>
-            <a:r>
-              <a:rPr lang="de-DE" dirty="0"/>
-              <a:t>Was, wenn ich Zeit nicht nur als X-Achse haben will?</a:t>
-            </a:r>
-          </a:p>
-          <a:p>
-            <a:pPr marL="171450" indent="-171450">
-              <a:buFont typeface="Arial" panose="020B0604020202020204" pitchFamily="34" charset="0"/>
-              <a:buChar char="•"/>
-            </a:pPr>
-            <a:r>
-              <a:rPr lang="de-DE" dirty="0"/>
-              <a:t>Automatisch schwierig (eigenes Forschungsfeld), deshalb manuell</a:t>
-            </a:r>
-          </a:p>
-          <a:p>
-            <a:pPr marL="171450" indent="-171450">
-              <a:buFont typeface="Arial" panose="020B0604020202020204" pitchFamily="34" charset="0"/>
-              <a:buChar char="•"/>
-            </a:pPr>
-            <a:endParaRPr lang="de-DE" dirty="0"/>
-          </a:p>
-          <a:p>
-            <a:pPr marL="0" indent="0">
-              <a:buFont typeface="Arial" panose="020B0604020202020204" pitchFamily="34" charset="0"/>
-              <a:buNone/>
-            </a:pPr>
-            <a:r>
-              <a:rPr lang="de-DE" dirty="0"/>
-              <a:t>WUNSCH?</a:t>
-            </a:r>
-          </a:p>
-          <a:p>
-            <a:pPr marL="171450" indent="-171450">
-              <a:buFont typeface="Arial" panose="020B0604020202020204" pitchFamily="34" charset="0"/>
-              <a:buChar char="•"/>
-            </a:pPr>
-            <a:r>
-              <a:rPr lang="de-DE" dirty="0"/>
-              <a:t>In Pflichtkriterien schlicht nicht notwendig / sinnvoll (</a:t>
-            </a:r>
-            <a:r>
-              <a:rPr lang="de-DE" dirty="0">
-                <a:sym typeface="Wingdings" panose="05000000000000000000" pitchFamily="2" charset="2"/>
-              </a:rPr>
-              <a:t>Verwirrung)</a:t>
-            </a:r>
-          </a:p>
-          <a:p>
-            <a:pPr marL="171450" indent="-171450">
-              <a:buFont typeface="Arial" panose="020B0604020202020204" pitchFamily="34" charset="0"/>
-              <a:buChar char="•"/>
-            </a:pPr>
-            <a:r>
-              <a:rPr lang="de-DE" dirty="0">
-                <a:sym typeface="Wingdings" panose="05000000000000000000" pitchFamily="2" charset="2"/>
-              </a:rPr>
-              <a:t>Aufwendige Checks, ob Datentypen überhaupt anwendbar sind für ein Diagramm</a:t>
-            </a:r>
           </a:p>
         </p:txBody>
       </p:sp>
@@ -5543,7 +5542,7 @@
     </p:spTree>
     <p:extLst>
       <p:ext uri="{BB962C8B-B14F-4D97-AF65-F5344CB8AC3E}">
-        <p14:creationId xmlns:p14="http://schemas.microsoft.com/office/powerpoint/2010/main" val="2724110977"/>
+        <p14:creationId xmlns:p14="http://schemas.microsoft.com/office/powerpoint/2010/main" val="2293199994"/>
       </p:ext>
     </p:extLst>
   </p:cSld>
@@ -5609,7 +5608,7 @@
             </a:pPr>
             <a:r>
               <a:rPr lang="de-DE" dirty="0"/>
-              <a:t>Nutzer können Templates (inkl. Bilder von Graphen) auf Server hoch- und von dort herunterladen</a:t>
+              <a:t>Nutzer kann Mapping Tabelle -&gt; Graph einstellen</a:t>
             </a:r>
           </a:p>
           <a:p>
@@ -5619,7 +5618,7 @@
             </a:pPr>
             <a:r>
               <a:rPr lang="de-DE" dirty="0"/>
-              <a:t>Beinhaltet sowohl Projekt- als auch Einstellungstemplates</a:t>
+              <a:t>Beinhaltet Spalte -&gt; Achse, aber auch Funktionen</a:t>
             </a:r>
           </a:p>
           <a:p>
@@ -5646,8 +5645,13 @@
             </a:pPr>
             <a:r>
               <a:rPr lang="de-DE" dirty="0"/>
-              <a:t>Anschauen -&gt; Inspiration</a:t>
-            </a:r>
+              <a:t>Neue Graphen sind u.U. nicht automatisch </a:t>
+            </a:r>
+            <a:r>
+              <a:rPr lang="de-DE" dirty="0" err="1"/>
+              <a:t>mappbar</a:t>
+            </a:r>
+            <a:endParaRPr lang="de-DE" dirty="0"/>
           </a:p>
           <a:p>
             <a:pPr marL="171450" indent="-171450">
@@ -5656,7 +5660,27 @@
             </a:pPr>
             <a:r>
               <a:rPr lang="de-DE" dirty="0"/>
-              <a:t>Coole Idee, aber keine Ahnung, wie umsetzen? Projekttemplate herunterladen</a:t>
+              <a:t>Neue Datentypen ebenfalls nicht</a:t>
+            </a:r>
+          </a:p>
+          <a:p>
+            <a:pPr marL="171450" indent="-171450">
+              <a:buFont typeface="Arial" panose="020B0604020202020204" pitchFamily="34" charset="0"/>
+              <a:buChar char="•"/>
+            </a:pPr>
+            <a:r>
+              <a:rPr lang="de-DE" dirty="0"/>
+              <a:t>Was, wenn ich Zeit nicht nur als X-Achse haben will?</a:t>
+            </a:r>
+          </a:p>
+          <a:p>
+            <a:pPr marL="171450" indent="-171450">
+              <a:buFont typeface="Arial" panose="020B0604020202020204" pitchFamily="34" charset="0"/>
+              <a:buChar char="•"/>
+            </a:pPr>
+            <a:r>
+              <a:rPr lang="de-DE" dirty="0"/>
+              <a:t>Automatisch schwierig (eigenes Forschungsfeld), deshalb manuell</a:t>
             </a:r>
           </a:p>
           <a:p>
@@ -5667,20 +5691,29 @@
             <a:endParaRPr lang="de-DE" dirty="0"/>
           </a:p>
           <a:p>
+            <a:pPr marL="0" indent="0">
+              <a:buFont typeface="Arial" panose="020B0604020202020204" pitchFamily="34" charset="0"/>
+              <a:buNone/>
+            </a:pPr>
+            <a:r>
+              <a:rPr lang="de-DE" dirty="0"/>
+              <a:t>WUNSCH?</a:t>
+            </a:r>
+          </a:p>
+          <a:p>
             <a:pPr marL="171450" indent="-171450">
               <a:buFont typeface="Arial" panose="020B0604020202020204" pitchFamily="34" charset="0"/>
               <a:buChar char="•"/>
             </a:pPr>
-            <a:endParaRPr lang="de-DE" dirty="0"/>
-          </a:p>
-          <a:p>
-            <a:pPr marL="0" indent="0">
-              <a:buFont typeface="Arial" panose="020B0604020202020204" pitchFamily="34" charset="0"/>
-              <a:buNone/>
-            </a:pPr>
             <a:r>
               <a:rPr lang="de-DE" dirty="0"/>
-              <a:t>WUNSCH?</a:t>
+              <a:t>In Pflichtkriterien schlicht nicht notwendig / sinnvoll (</a:t>
+            </a:r>
+            <a:r>
+              <a:rPr lang="de-DE" dirty="0">
+                <a:sym typeface="Wingdings" panose="05000000000000000000" pitchFamily="2" charset="2"/>
+              </a:rPr>
+              <a:t>Verwirrung)</a:t>
             </a:r>
           </a:p>
           <a:p>
@@ -5689,44 +5722,11 @@
               <a:buChar char="•"/>
             </a:pPr>
             <a:r>
-              <a:rPr lang="de-DE" dirty="0"/>
-              <a:t>Serverauslastung schwerer vorhersehbar als bei Online-Projekten</a:t>
-            </a:r>
-          </a:p>
-          <a:p>
-            <a:pPr marL="171450" indent="-171450">
-              <a:buFont typeface="Arial" panose="020B0604020202020204" pitchFamily="34" charset="0"/>
-              <a:buChar char="•"/>
-            </a:pPr>
-            <a:r>
-              <a:rPr lang="de-DE" dirty="0"/>
-              <a:t>Spam-Schutz? Wie? Ähnlichkeit? </a:t>
-            </a:r>
-            <a:r>
               <a:rPr lang="de-DE" dirty="0">
                 <a:sym typeface="Wingdings" panose="05000000000000000000" pitchFamily="2" charset="2"/>
               </a:rPr>
-              <a:t> Aufwendig</a:t>
-            </a:r>
-          </a:p>
-          <a:p>
-            <a:pPr marL="171450" indent="-171450">
-              <a:buFont typeface="Arial" panose="020B0604020202020204" pitchFamily="34" charset="0"/>
-              <a:buChar char="•"/>
-            </a:pPr>
-            <a:r>
-              <a:rPr lang="de-DE" dirty="0">
-                <a:sym typeface="Wingdings" panose="05000000000000000000" pitchFamily="2" charset="2"/>
-              </a:rPr>
-              <a:t>Bei Pflichtkriterien auch kein Mehrwert für Punkt 2, da nicht so aufwendige </a:t>
-            </a:r>
-            <a:r>
-              <a:rPr lang="de-DE">
-                <a:sym typeface="Wingdings" panose="05000000000000000000" pitchFamily="2" charset="2"/>
-              </a:rPr>
-              <a:t>Projekte möglich</a:t>
-            </a:r>
-            <a:endParaRPr lang="de-DE"/>
+              <a:t>Aufwendige Checks, ob Datentypen überhaupt anwendbar sind für ein Diagramm</a:t>
+            </a:r>
           </a:p>
         </p:txBody>
       </p:sp>
@@ -5756,7 +5756,7 @@
     </p:spTree>
     <p:extLst>
       <p:ext uri="{BB962C8B-B14F-4D97-AF65-F5344CB8AC3E}">
-        <p14:creationId xmlns:p14="http://schemas.microsoft.com/office/powerpoint/2010/main" val="4235440513"/>
+        <p14:creationId xmlns:p14="http://schemas.microsoft.com/office/powerpoint/2010/main" val="2724110977"/>
       </p:ext>
     </p:extLst>
   </p:cSld>
@@ -10180,7 +10180,7 @@
           <a:p>
             <a:r>
               <a:rPr lang="de-DE" dirty="0"/>
-              <a:t>Pflichtenheft</a:t>
+              <a:t>Definitionsphase</a:t>
             </a:r>
           </a:p>
         </p:txBody>
@@ -10424,47 +10424,40 @@
           <a:chExt cx="0" cy="0"/>
         </a:xfrm>
       </p:grpSpPr>
-      <p:pic>
-        <p:nvPicPr>
-          <p:cNvPr id="7" name="Inhaltsplatzhalter 6" descr="Frau mit einfarbiger Füllung">
+      <p:sp>
+        <p:nvSpPr>
+          <p:cNvPr id="2" name="Titel 1">
             <a:extLst>
               <a:ext uri="{FF2B5EF4-FFF2-40B4-BE49-F238E27FC236}">
-                <a16:creationId xmlns:a16="http://schemas.microsoft.com/office/drawing/2014/main" id="{B672DE49-A8E7-7749-A03D-3566A208D9D7}"/>
+                <a16:creationId xmlns:a16="http://schemas.microsoft.com/office/drawing/2014/main" id="{42DB923A-A1B1-8648-BD87-4A32709229CC}"/>
               </a:ext>
             </a:extLst>
           </p:cNvPr>
-          <p:cNvPicPr>
-            <a:picLocks noGrp="1" noChangeAspect="1"/>
-          </p:cNvPicPr>
+          <p:cNvSpPr>
+            <a:spLocks noGrp="1"/>
+          </p:cNvSpPr>
           <p:nvPr>
-            <p:ph idx="1"/>
+            <p:ph type="title"/>
           </p:nvPr>
-        </p:nvPicPr>
-        <p:blipFill>
-          <a:blip r:embed="rId3">
-            <a:extLst>
-              <a:ext uri="{96DAC541-7B7A-43D3-8B79-37D633B846F1}">
-                <asvg:svgBlip xmlns:asvg="http://schemas.microsoft.com/office/drawing/2016/SVG/main" r:embed="rId4"/>
-              </a:ext>
-            </a:extLst>
-          </a:blip>
-          <a:stretch>
-            <a:fillRect/>
-          </a:stretch>
-        </p:blipFill>
-        <p:spPr>
-          <a:xfrm>
-            <a:off x="1607127" y="1909258"/>
-            <a:ext cx="2396836" cy="2396836"/>
-          </a:xfrm>
-        </p:spPr>
-      </p:pic>
+        </p:nvSpPr>
+        <p:spPr/>
+        <p:txBody>
+          <a:bodyPr/>
+          <a:lstStyle/>
+          <a:p>
+            <a:r>
+              <a:rPr lang="de-DE" dirty="0"/>
+              <a:t>Hochladen von Templates</a:t>
+            </a:r>
+          </a:p>
+        </p:txBody>
+      </p:sp>
       <p:sp>
         <p:nvSpPr>
           <p:cNvPr id="4" name="Datumsplatzhalter 3">
             <a:extLst>
               <a:ext uri="{FF2B5EF4-FFF2-40B4-BE49-F238E27FC236}">
-                <a16:creationId xmlns:a16="http://schemas.microsoft.com/office/drawing/2014/main" id="{E19FA10C-737D-6347-9EE4-72BB845236FF}"/>
+                <a16:creationId xmlns:a16="http://schemas.microsoft.com/office/drawing/2014/main" id="{792E0081-E7AC-E740-B2D3-182E8F042CCE}"/>
               </a:ext>
             </a:extLst>
           </p:cNvPr>
@@ -10492,7 +10485,7 @@
           <p:cNvPr id="5" name="Foliennummernplatzhalter 4">
             <a:extLst>
               <a:ext uri="{FF2B5EF4-FFF2-40B4-BE49-F238E27FC236}">
-                <a16:creationId xmlns:a16="http://schemas.microsoft.com/office/drawing/2014/main" id="{25E81763-1F78-3E42-9F48-9FD645C972D2}"/>
+                <a16:creationId xmlns:a16="http://schemas.microsoft.com/office/drawing/2014/main" id="{1DDFCF15-B3DF-E844-B016-FD1566765C8D}"/>
               </a:ext>
             </a:extLst>
           </p:cNvPr>
@@ -10516,523 +10509,12 @@
           </a:p>
         </p:txBody>
       </p:sp>
-      <p:pic>
-        <p:nvPicPr>
-          <p:cNvPr id="9" name="Grafik 8" descr="Flasche mit einfarbiger Füllung">
-            <a:extLst>
-              <a:ext uri="{FF2B5EF4-FFF2-40B4-BE49-F238E27FC236}">
-                <a16:creationId xmlns:a16="http://schemas.microsoft.com/office/drawing/2014/main" id="{7B071123-7BB5-B442-92A0-B54D32729818}"/>
-              </a:ext>
-            </a:extLst>
-          </p:cNvPr>
-          <p:cNvPicPr>
-            <a:picLocks noChangeAspect="1"/>
-          </p:cNvPicPr>
-          <p:nvPr/>
-        </p:nvPicPr>
-        <p:blipFill>
-          <a:blip r:embed="rId5">
-            <a:extLst>
-              <a:ext uri="{96DAC541-7B7A-43D3-8B79-37D633B846F1}">
-                <asvg:svgBlip xmlns:asvg="http://schemas.microsoft.com/office/drawing/2016/SVG/main" r:embed="rId6"/>
-              </a:ext>
-            </a:extLst>
-          </a:blip>
-          <a:stretch>
-            <a:fillRect/>
-          </a:stretch>
-        </p:blipFill>
-        <p:spPr>
-          <a:xfrm>
-            <a:off x="5638800" y="3107676"/>
-            <a:ext cx="1745673" cy="1745673"/>
-          </a:xfrm>
-          <a:prstGeom prst="rect">
-            <a:avLst/>
-          </a:prstGeom>
-        </p:spPr>
-      </p:pic>
-      <p:pic>
-        <p:nvPicPr>
-          <p:cNvPr id="11" name="Grafik 10" descr="Kaffee mit einfarbiger Füllung">
-            <a:extLst>
-              <a:ext uri="{FF2B5EF4-FFF2-40B4-BE49-F238E27FC236}">
-                <a16:creationId xmlns:a16="http://schemas.microsoft.com/office/drawing/2014/main" id="{B2FF02C6-5F90-7C49-8FB7-4D8FCCE30638}"/>
-              </a:ext>
-            </a:extLst>
-          </p:cNvPr>
-          <p:cNvPicPr>
-            <a:picLocks noChangeAspect="1"/>
-          </p:cNvPicPr>
-          <p:nvPr/>
-        </p:nvPicPr>
-        <p:blipFill>
-          <a:blip r:embed="rId7">
-            <a:extLst>
-              <a:ext uri="{96DAC541-7B7A-43D3-8B79-37D633B846F1}">
-                <asvg:svgBlip xmlns:asvg="http://schemas.microsoft.com/office/drawing/2016/SVG/main" r:embed="rId8"/>
-              </a:ext>
-            </a:extLst>
-          </a:blip>
-          <a:stretch>
-            <a:fillRect/>
-          </a:stretch>
-        </p:blipFill>
-        <p:spPr>
-          <a:xfrm>
-            <a:off x="7301347" y="3034145"/>
-            <a:ext cx="1745672" cy="1745672"/>
-          </a:xfrm>
-          <a:prstGeom prst="rect">
-            <a:avLst/>
-          </a:prstGeom>
-        </p:spPr>
-      </p:pic>
-      <p:pic>
-        <p:nvPicPr>
-          <p:cNvPr id="12" name="Grafik 11" descr="Flasche mit einfarbiger Füllung">
-            <a:extLst>
-              <a:ext uri="{FF2B5EF4-FFF2-40B4-BE49-F238E27FC236}">
-                <a16:creationId xmlns:a16="http://schemas.microsoft.com/office/drawing/2014/main" id="{5F0CED33-0E61-D649-ACB7-0C25A3B72DE6}"/>
-              </a:ext>
-            </a:extLst>
-          </p:cNvPr>
-          <p:cNvPicPr>
-            <a:picLocks noChangeAspect="1"/>
-          </p:cNvPicPr>
-          <p:nvPr/>
-        </p:nvPicPr>
-        <p:blipFill>
-          <a:blip r:embed="rId5">
-            <a:extLst>
-              <a:ext uri="{96DAC541-7B7A-43D3-8B79-37D633B846F1}">
-                <asvg:svgBlip xmlns:asvg="http://schemas.microsoft.com/office/drawing/2016/SVG/main" r:embed="rId6"/>
-              </a:ext>
-            </a:extLst>
-          </a:blip>
-          <a:stretch>
-            <a:fillRect/>
-          </a:stretch>
-        </p:blipFill>
-        <p:spPr>
-          <a:xfrm>
-            <a:off x="6497782" y="1580753"/>
-            <a:ext cx="1745673" cy="1745673"/>
-          </a:xfrm>
-          <a:prstGeom prst="rect">
-            <a:avLst/>
-          </a:prstGeom>
-        </p:spPr>
-      </p:pic>
-      <p:pic>
-        <p:nvPicPr>
-          <p:cNvPr id="13" name="Grafik 12" descr="Kaffee mit einfarbiger Füllung">
-            <a:extLst>
-              <a:ext uri="{FF2B5EF4-FFF2-40B4-BE49-F238E27FC236}">
-                <a16:creationId xmlns:a16="http://schemas.microsoft.com/office/drawing/2014/main" id="{C4663941-8982-6347-8B64-E62DB881DDBD}"/>
-              </a:ext>
-            </a:extLst>
-          </p:cNvPr>
-          <p:cNvPicPr>
-            <a:picLocks noChangeAspect="1"/>
-          </p:cNvPicPr>
-          <p:nvPr/>
-        </p:nvPicPr>
-        <p:blipFill>
-          <a:blip r:embed="rId7">
-            <a:extLst>
-              <a:ext uri="{96DAC541-7B7A-43D3-8B79-37D633B846F1}">
-                <asvg:svgBlip xmlns:asvg="http://schemas.microsoft.com/office/drawing/2016/SVG/main" r:embed="rId8"/>
-              </a:ext>
-            </a:extLst>
-          </a:blip>
-          <a:stretch>
-            <a:fillRect/>
-          </a:stretch>
-        </p:blipFill>
-        <p:spPr>
-          <a:xfrm>
-            <a:off x="8534403" y="1580753"/>
-            <a:ext cx="1745672" cy="1745672"/>
-          </a:xfrm>
-          <a:prstGeom prst="rect">
-            <a:avLst/>
-          </a:prstGeom>
-        </p:spPr>
-      </p:pic>
-      <p:pic>
-        <p:nvPicPr>
-          <p:cNvPr id="14" name="Grafik 13" descr="Fragezeichen mit einfarbiger Füllung">
-            <a:extLst>
-              <a:ext uri="{FF2B5EF4-FFF2-40B4-BE49-F238E27FC236}">
-                <a16:creationId xmlns:a16="http://schemas.microsoft.com/office/drawing/2014/main" id="{376A232C-4C36-C646-A410-41DBABFACAC8}"/>
-              </a:ext>
-            </a:extLst>
-          </p:cNvPr>
-          <p:cNvPicPr>
-            <a:picLocks noChangeAspect="1"/>
-          </p:cNvPicPr>
-          <p:nvPr/>
-        </p:nvPicPr>
-        <p:blipFill>
-          <a:blip r:embed="rId9">
-            <a:extLst>
-              <a:ext uri="{96DAC541-7B7A-43D3-8B79-37D633B846F1}">
-                <asvg:svgBlip xmlns:asvg="http://schemas.microsoft.com/office/drawing/2016/SVG/main" r:embed="rId10"/>
-              </a:ext>
-            </a:extLst>
-          </a:blip>
-          <a:stretch>
-            <a:fillRect/>
-          </a:stretch>
-        </p:blipFill>
-        <p:spPr>
-          <a:xfrm>
-            <a:off x="4225635" y="2071254"/>
-            <a:ext cx="1925782" cy="1925782"/>
-          </a:xfrm>
-          <a:prstGeom prst="rect">
-            <a:avLst/>
-          </a:prstGeom>
-        </p:spPr>
-      </p:pic>
-    </p:spTree>
-    <p:extLst>
-      <p:ext uri="{BB962C8B-B14F-4D97-AF65-F5344CB8AC3E}">
-        <p14:creationId xmlns:p14="http://schemas.microsoft.com/office/powerpoint/2010/main" val="1841952403"/>
-      </p:ext>
-    </p:extLst>
-  </p:cSld>
-  <p:clrMapOvr>
-    <a:masterClrMapping/>
-  </p:clrMapOvr>
-</p:sld>
-</file>
-
-<file path=ppt/slides/slide12.xml><?xml version="1.0" encoding="utf-8"?>
-<p:sld xmlns:a="http://schemas.openxmlformats.org/drawingml/2006/main" xmlns:r="http://schemas.openxmlformats.org/officeDocument/2006/relationships" xmlns:p="http://schemas.openxmlformats.org/presentationml/2006/main">
-  <p:cSld>
-    <p:spTree>
-      <p:nvGrpSpPr>
-        <p:cNvPr id="1" name=""/>
-        <p:cNvGrpSpPr/>
-        <p:nvPr/>
-      </p:nvGrpSpPr>
-      <p:grpSpPr>
-        <a:xfrm>
-          <a:off x="0" y="0"/>
-          <a:ext cx="0" cy="0"/>
-          <a:chOff x="0" y="0"/>
-          <a:chExt cx="0" cy="0"/>
-        </a:xfrm>
-      </p:grpSpPr>
-      <p:sp>
-        <p:nvSpPr>
-          <p:cNvPr id="2" name="Titel 1">
-            <a:extLst>
-              <a:ext uri="{FF2B5EF4-FFF2-40B4-BE49-F238E27FC236}">
-                <a16:creationId xmlns:a16="http://schemas.microsoft.com/office/drawing/2014/main" id="{DC10472C-A722-2447-B559-3E2A15526694}"/>
-              </a:ext>
-            </a:extLst>
-          </p:cNvPr>
-          <p:cNvSpPr>
-            <a:spLocks noGrp="1"/>
-          </p:cNvSpPr>
-          <p:nvPr>
-            <p:ph type="title"/>
-          </p:nvPr>
-        </p:nvSpPr>
-        <p:spPr/>
-        <p:txBody>
-          <a:bodyPr/>
-          <a:lstStyle/>
-          <a:p>
-            <a:r>
-              <a:rPr lang="de-DE" dirty="0"/>
-              <a:t>Tabelle bearbeiten</a:t>
-            </a:r>
-          </a:p>
-        </p:txBody>
-      </p:sp>
-      <p:sp>
-        <p:nvSpPr>
-          <p:cNvPr id="3" name="Inhaltsplatzhalter 2">
-            <a:extLst>
-              <a:ext uri="{FF2B5EF4-FFF2-40B4-BE49-F238E27FC236}">
-                <a16:creationId xmlns:a16="http://schemas.microsoft.com/office/drawing/2014/main" id="{B4CE9685-B6BD-E54F-9949-8301147A8987}"/>
-              </a:ext>
-            </a:extLst>
-          </p:cNvPr>
-          <p:cNvSpPr>
-            <a:spLocks noGrp="1"/>
-          </p:cNvSpPr>
-          <p:nvPr>
-            <p:ph sz="half" idx="1"/>
-          </p:nvPr>
-        </p:nvSpPr>
-        <p:spPr/>
-        <p:txBody>
-          <a:bodyPr/>
-          <a:lstStyle/>
-          <a:p>
-            <a:pPr marL="0" indent="0">
-              <a:buNone/>
-            </a:pPr>
-            <a:r>
-              <a:rPr lang="de-DE" i="1" dirty="0"/>
-              <a:t>Warum gewünscht: </a:t>
-            </a:r>
-          </a:p>
-          <a:p>
-            <a:pPr marL="0" indent="0">
-              <a:buNone/>
-            </a:pPr>
-            <a:endParaRPr lang="de-DE" dirty="0"/>
-          </a:p>
-          <a:p>
-            <a:r>
-              <a:rPr lang="de-DE" dirty="0"/>
-              <a:t>Zeilen &amp; Spalten hinzufügen</a:t>
-            </a:r>
-          </a:p>
-          <a:p>
-            <a:r>
-              <a:rPr lang="de-DE" dirty="0"/>
-              <a:t>Neue Ideen</a:t>
-            </a:r>
-          </a:p>
-          <a:p>
-            <a:r>
-              <a:rPr lang="de-DE" dirty="0"/>
-              <a:t>Korrekturmöglichkeiten</a:t>
-            </a:r>
-          </a:p>
-        </p:txBody>
-      </p:sp>
-      <p:sp>
-        <p:nvSpPr>
-          <p:cNvPr id="4" name="Inhaltsplatzhalter 3">
-            <a:extLst>
-              <a:ext uri="{FF2B5EF4-FFF2-40B4-BE49-F238E27FC236}">
-                <a16:creationId xmlns:a16="http://schemas.microsoft.com/office/drawing/2014/main" id="{1825F776-8941-3A45-808C-5F30340B4C02}"/>
-              </a:ext>
-            </a:extLst>
-          </p:cNvPr>
-          <p:cNvSpPr>
-            <a:spLocks noGrp="1"/>
-          </p:cNvSpPr>
-          <p:nvPr>
-            <p:ph sz="half" idx="2"/>
-          </p:nvPr>
-        </p:nvSpPr>
-        <p:spPr/>
-        <p:txBody>
-          <a:bodyPr/>
-          <a:lstStyle/>
-          <a:p>
-            <a:pPr marL="0" indent="0">
-              <a:buNone/>
-            </a:pPr>
-            <a:r>
-              <a:rPr lang="de-DE" i="1" dirty="0"/>
-              <a:t>Warum Wunsch:</a:t>
-            </a:r>
-          </a:p>
-          <a:p>
-            <a:pPr marL="0" indent="0">
-              <a:buNone/>
-            </a:pPr>
-            <a:endParaRPr lang="de-DE" dirty="0"/>
-          </a:p>
-          <a:p>
-            <a:r>
-              <a:rPr lang="de-DE" dirty="0"/>
-              <a:t>Hohes Konfliktpotential</a:t>
-            </a:r>
-          </a:p>
-          <a:p>
-            <a:endParaRPr lang="de-DE" dirty="0"/>
-          </a:p>
-        </p:txBody>
-      </p:sp>
-      <p:sp>
-        <p:nvSpPr>
-          <p:cNvPr id="5" name="Datumsplatzhalter 4">
-            <a:extLst>
-              <a:ext uri="{FF2B5EF4-FFF2-40B4-BE49-F238E27FC236}">
-                <a16:creationId xmlns:a16="http://schemas.microsoft.com/office/drawing/2014/main" id="{D8780823-4011-B446-8F50-A7EEA649C23D}"/>
-              </a:ext>
-            </a:extLst>
-          </p:cNvPr>
-          <p:cNvSpPr>
-            <a:spLocks noGrp="1"/>
-          </p:cNvSpPr>
-          <p:nvPr>
-            <p:ph type="dt" sz="half" idx="10"/>
-          </p:nvPr>
-        </p:nvSpPr>
-        <p:spPr/>
-        <p:txBody>
-          <a:bodyPr/>
-          <a:lstStyle/>
-          <a:p>
-            <a:r>
-              <a:rPr lang="de-DE"/>
-              <a:t>03.12.21</a:t>
-            </a:r>
-          </a:p>
-        </p:txBody>
-      </p:sp>
-      <p:sp>
-        <p:nvSpPr>
-          <p:cNvPr id="6" name="Foliennummernplatzhalter 5">
-            <a:extLst>
-              <a:ext uri="{FF2B5EF4-FFF2-40B4-BE49-F238E27FC236}">
-                <a16:creationId xmlns:a16="http://schemas.microsoft.com/office/drawing/2014/main" id="{B5EE29CD-5AC9-344B-8B73-C8F68BF714AA}"/>
-              </a:ext>
-            </a:extLst>
-          </p:cNvPr>
-          <p:cNvSpPr>
-            <a:spLocks noGrp="1"/>
-          </p:cNvSpPr>
-          <p:nvPr>
-            <p:ph type="sldNum" sz="quarter" idx="12"/>
-          </p:nvPr>
-        </p:nvSpPr>
-        <p:spPr/>
-        <p:txBody>
-          <a:bodyPr/>
-          <a:lstStyle/>
-          <a:p>
-            <a:fld id="{C1951030-1712-A844-813B-C453E8FB818E}" type="slidenum">
-              <a:rPr lang="de-DE" smtClean="0"/>
-              <a:t>12</a:t>
-            </a:fld>
-            <a:endParaRPr lang="de-DE"/>
-          </a:p>
-        </p:txBody>
-      </p:sp>
-    </p:spTree>
-    <p:extLst>
-      <p:ext uri="{BB962C8B-B14F-4D97-AF65-F5344CB8AC3E}">
-        <p14:creationId xmlns:p14="http://schemas.microsoft.com/office/powerpoint/2010/main" val="4009044167"/>
-      </p:ext>
-    </p:extLst>
-  </p:cSld>
-  <p:clrMapOvr>
-    <a:masterClrMapping/>
-  </p:clrMapOvr>
-</p:sld>
-</file>
-
-<file path=ppt/slides/slide13.xml><?xml version="1.0" encoding="utf-8"?>
-<p:sld xmlns:a="http://schemas.openxmlformats.org/drawingml/2006/main" xmlns:r="http://schemas.openxmlformats.org/officeDocument/2006/relationships" xmlns:p="http://schemas.openxmlformats.org/presentationml/2006/main">
-  <p:cSld>
-    <p:spTree>
-      <p:nvGrpSpPr>
-        <p:cNvPr id="1" name=""/>
-        <p:cNvGrpSpPr/>
-        <p:nvPr/>
-      </p:nvGrpSpPr>
-      <p:grpSpPr>
-        <a:xfrm>
-          <a:off x="0" y="0"/>
-          <a:ext cx="0" cy="0"/>
-          <a:chOff x="0" y="0"/>
-          <a:chExt cx="0" cy="0"/>
-        </a:xfrm>
-      </p:grpSpPr>
-      <p:sp>
-        <p:nvSpPr>
-          <p:cNvPr id="2" name="Titel 1">
-            <a:extLst>
-              <a:ext uri="{FF2B5EF4-FFF2-40B4-BE49-F238E27FC236}">
-                <a16:creationId xmlns:a16="http://schemas.microsoft.com/office/drawing/2014/main" id="{FEBB81A3-B09F-9E4F-99C9-B6FA29532151}"/>
-              </a:ext>
-            </a:extLst>
-          </p:cNvPr>
-          <p:cNvSpPr>
-            <a:spLocks noGrp="1"/>
-          </p:cNvSpPr>
-          <p:nvPr>
-            <p:ph type="title"/>
-          </p:nvPr>
-        </p:nvSpPr>
-        <p:spPr/>
-        <p:txBody>
-          <a:bodyPr/>
-          <a:lstStyle/>
-          <a:p>
-            <a:r>
-              <a:rPr lang="de-DE" dirty="0"/>
-              <a:t>Parametrisierung</a:t>
-            </a:r>
-          </a:p>
-        </p:txBody>
-      </p:sp>
-      <p:sp>
-        <p:nvSpPr>
-          <p:cNvPr id="4" name="Datumsplatzhalter 3">
-            <a:extLst>
-              <a:ext uri="{FF2B5EF4-FFF2-40B4-BE49-F238E27FC236}">
-                <a16:creationId xmlns:a16="http://schemas.microsoft.com/office/drawing/2014/main" id="{37E5153A-0133-6446-8E9C-1E524EC4F28E}"/>
-              </a:ext>
-            </a:extLst>
-          </p:cNvPr>
-          <p:cNvSpPr>
-            <a:spLocks noGrp="1"/>
-          </p:cNvSpPr>
-          <p:nvPr>
-            <p:ph type="dt" sz="half" idx="10"/>
-          </p:nvPr>
-        </p:nvSpPr>
-        <p:spPr/>
-        <p:txBody>
-          <a:bodyPr/>
-          <a:lstStyle/>
-          <a:p>
-            <a:r>
-              <a:rPr lang="de-DE"/>
-              <a:t>03.12.21</a:t>
-            </a:r>
-          </a:p>
-        </p:txBody>
-      </p:sp>
-      <p:sp>
-        <p:nvSpPr>
-          <p:cNvPr id="5" name="Foliennummernplatzhalter 4">
-            <a:extLst>
-              <a:ext uri="{FF2B5EF4-FFF2-40B4-BE49-F238E27FC236}">
-                <a16:creationId xmlns:a16="http://schemas.microsoft.com/office/drawing/2014/main" id="{83177281-6097-E248-B00D-0814B4886B8D}"/>
-              </a:ext>
-            </a:extLst>
-          </p:cNvPr>
-          <p:cNvSpPr>
-            <a:spLocks noGrp="1"/>
-          </p:cNvSpPr>
-          <p:nvPr>
-            <p:ph type="sldNum" sz="quarter" idx="12"/>
-          </p:nvPr>
-        </p:nvSpPr>
-        <p:spPr/>
-        <p:txBody>
-          <a:bodyPr/>
-          <a:lstStyle/>
-          <a:p>
-            <a:fld id="{C1951030-1712-A844-813B-C453E8FB818E}" type="slidenum">
-              <a:rPr lang="de-DE" smtClean="0"/>
-              <a:t>13</a:t>
-            </a:fld>
-            <a:endParaRPr lang="de-DE"/>
-          </a:p>
-        </p:txBody>
-      </p:sp>
       <p:sp>
         <p:nvSpPr>
           <p:cNvPr id="6" name="Inhaltsplatzhalter 2">
             <a:extLst>
               <a:ext uri="{FF2B5EF4-FFF2-40B4-BE49-F238E27FC236}">
-                <a16:creationId xmlns:a16="http://schemas.microsoft.com/office/drawing/2014/main" id="{8A76C604-608B-4DA8-92CD-CD20B2C59395}"/>
+                <a16:creationId xmlns:a16="http://schemas.microsoft.com/office/drawing/2014/main" id="{64F14DAB-9492-48F6-9352-749778F15D15}"/>
               </a:ext>
             </a:extLst>
           </p:cNvPr>
@@ -11225,7 +10707,7 @@
             </a:pPr>
             <a:r>
               <a:rPr lang="de-DE" i="1" dirty="0"/>
-              <a:t>Warum gewünscht: </a:t>
+              <a:t>Warum interessant: </a:t>
             </a:r>
           </a:p>
           <a:p>
@@ -11238,19 +10720,13 @@
           <a:p>
             <a:r>
               <a:rPr lang="de-DE" dirty="0"/>
-              <a:t>Neue Graphen</a:t>
+              <a:t>Inspiration für Projekte von anderen Nutzern</a:t>
             </a:r>
           </a:p>
           <a:p>
             <a:r>
               <a:rPr lang="de-DE" dirty="0"/>
-              <a:t>Neue Datentypen</a:t>
-            </a:r>
-          </a:p>
-          <a:p>
-            <a:r>
-              <a:rPr lang="de-DE" dirty="0"/>
-              <a:t>Andere Verwendung der existierende Graphen</a:t>
+              <a:t>Einfache Möglichkeit, aufwendigere Projekte zu starten</a:t>
             </a:r>
           </a:p>
         </p:txBody>
@@ -11260,7 +10736,7 @@
           <p:cNvPr id="7" name="Inhaltsplatzhalter 3">
             <a:extLst>
               <a:ext uri="{FF2B5EF4-FFF2-40B4-BE49-F238E27FC236}">
-                <a16:creationId xmlns:a16="http://schemas.microsoft.com/office/drawing/2014/main" id="{2809ED00-FEDA-4690-A59A-884CFB5FDA2C}"/>
+                <a16:creationId xmlns:a16="http://schemas.microsoft.com/office/drawing/2014/main" id="{52C3776E-0D32-4519-8F17-3FCD3E951196}"/>
               </a:ext>
             </a:extLst>
           </p:cNvPr>
@@ -11464,13 +10940,13 @@
           <a:p>
             <a:r>
               <a:rPr lang="de-DE" dirty="0"/>
-              <a:t>Bei Basisdatentypen /-graphen nicht notwendig</a:t>
+              <a:t>Deutlich schwieriger einschätzbare Serverauslastung</a:t>
             </a:r>
           </a:p>
           <a:p>
             <a:r>
               <a:rPr lang="de-DE" dirty="0"/>
-              <a:t>Teilweise aufwendige Checks notwendig</a:t>
+              <a:t>Kein Mehrwert bei Basisdatentypen /-graphen</a:t>
             </a:r>
           </a:p>
           <a:p>
@@ -11481,7 +10957,525 @@
     </p:spTree>
     <p:extLst>
       <p:ext uri="{BB962C8B-B14F-4D97-AF65-F5344CB8AC3E}">
-        <p14:creationId xmlns:p14="http://schemas.microsoft.com/office/powerpoint/2010/main" val="2401719195"/>
+        <p14:creationId xmlns:p14="http://schemas.microsoft.com/office/powerpoint/2010/main" val="2432425423"/>
+      </p:ext>
+    </p:extLst>
+  </p:cSld>
+  <p:clrMapOvr>
+    <a:masterClrMapping/>
+  </p:clrMapOvr>
+</p:sld>
+</file>
+
+<file path=ppt/slides/slide12.xml><?xml version="1.0" encoding="utf-8"?>
+<p:sld xmlns:a="http://schemas.openxmlformats.org/drawingml/2006/main" xmlns:r="http://schemas.openxmlformats.org/officeDocument/2006/relationships" xmlns:p="http://schemas.openxmlformats.org/presentationml/2006/main">
+  <p:cSld>
+    <p:spTree>
+      <p:nvGrpSpPr>
+        <p:cNvPr id="1" name=""/>
+        <p:cNvGrpSpPr/>
+        <p:nvPr/>
+      </p:nvGrpSpPr>
+      <p:grpSpPr>
+        <a:xfrm>
+          <a:off x="0" y="0"/>
+          <a:ext cx="0" cy="0"/>
+          <a:chOff x="0" y="0"/>
+          <a:chExt cx="0" cy="0"/>
+        </a:xfrm>
+      </p:grpSpPr>
+      <p:pic>
+        <p:nvPicPr>
+          <p:cNvPr id="7" name="Inhaltsplatzhalter 6" descr="Frau mit einfarbiger Füllung">
+            <a:extLst>
+              <a:ext uri="{FF2B5EF4-FFF2-40B4-BE49-F238E27FC236}">
+                <a16:creationId xmlns:a16="http://schemas.microsoft.com/office/drawing/2014/main" id="{B672DE49-A8E7-7749-A03D-3566A208D9D7}"/>
+              </a:ext>
+            </a:extLst>
+          </p:cNvPr>
+          <p:cNvPicPr>
+            <a:picLocks noGrp="1" noChangeAspect="1"/>
+          </p:cNvPicPr>
+          <p:nvPr>
+            <p:ph idx="1"/>
+          </p:nvPr>
+        </p:nvPicPr>
+        <p:blipFill>
+          <a:blip r:embed="rId3">
+            <a:extLst>
+              <a:ext uri="{96DAC541-7B7A-43D3-8B79-37D633B846F1}">
+                <asvg:svgBlip xmlns:asvg="http://schemas.microsoft.com/office/drawing/2016/SVG/main" r:embed="rId4"/>
+              </a:ext>
+            </a:extLst>
+          </a:blip>
+          <a:stretch>
+            <a:fillRect/>
+          </a:stretch>
+        </p:blipFill>
+        <p:spPr>
+          <a:xfrm>
+            <a:off x="1607127" y="1909258"/>
+            <a:ext cx="2396836" cy="2396836"/>
+          </a:xfrm>
+        </p:spPr>
+      </p:pic>
+      <p:sp>
+        <p:nvSpPr>
+          <p:cNvPr id="4" name="Datumsplatzhalter 3">
+            <a:extLst>
+              <a:ext uri="{FF2B5EF4-FFF2-40B4-BE49-F238E27FC236}">
+                <a16:creationId xmlns:a16="http://schemas.microsoft.com/office/drawing/2014/main" id="{E19FA10C-737D-6347-9EE4-72BB845236FF}"/>
+              </a:ext>
+            </a:extLst>
+          </p:cNvPr>
+          <p:cNvSpPr>
+            <a:spLocks noGrp="1"/>
+          </p:cNvSpPr>
+          <p:nvPr>
+            <p:ph type="dt" sz="half" idx="10"/>
+          </p:nvPr>
+        </p:nvSpPr>
+        <p:spPr/>
+        <p:txBody>
+          <a:bodyPr/>
+          <a:lstStyle/>
+          <a:p>
+            <a:r>
+              <a:rPr lang="de-DE"/>
+              <a:t>03.12.21</a:t>
+            </a:r>
+          </a:p>
+        </p:txBody>
+      </p:sp>
+      <p:sp>
+        <p:nvSpPr>
+          <p:cNvPr id="5" name="Foliennummernplatzhalter 4">
+            <a:extLst>
+              <a:ext uri="{FF2B5EF4-FFF2-40B4-BE49-F238E27FC236}">
+                <a16:creationId xmlns:a16="http://schemas.microsoft.com/office/drawing/2014/main" id="{25E81763-1F78-3E42-9F48-9FD645C972D2}"/>
+              </a:ext>
+            </a:extLst>
+          </p:cNvPr>
+          <p:cNvSpPr>
+            <a:spLocks noGrp="1"/>
+          </p:cNvSpPr>
+          <p:nvPr>
+            <p:ph type="sldNum" sz="quarter" idx="12"/>
+          </p:nvPr>
+        </p:nvSpPr>
+        <p:spPr/>
+        <p:txBody>
+          <a:bodyPr/>
+          <a:lstStyle/>
+          <a:p>
+            <a:fld id="{C1951030-1712-A844-813B-C453E8FB818E}" type="slidenum">
+              <a:rPr lang="de-DE" smtClean="0"/>
+              <a:t>12</a:t>
+            </a:fld>
+            <a:endParaRPr lang="de-DE"/>
+          </a:p>
+        </p:txBody>
+      </p:sp>
+      <p:pic>
+        <p:nvPicPr>
+          <p:cNvPr id="9" name="Grafik 8" descr="Flasche mit einfarbiger Füllung">
+            <a:extLst>
+              <a:ext uri="{FF2B5EF4-FFF2-40B4-BE49-F238E27FC236}">
+                <a16:creationId xmlns:a16="http://schemas.microsoft.com/office/drawing/2014/main" id="{7B071123-7BB5-B442-92A0-B54D32729818}"/>
+              </a:ext>
+            </a:extLst>
+          </p:cNvPr>
+          <p:cNvPicPr>
+            <a:picLocks noChangeAspect="1"/>
+          </p:cNvPicPr>
+          <p:nvPr/>
+        </p:nvPicPr>
+        <p:blipFill>
+          <a:blip r:embed="rId5">
+            <a:extLst>
+              <a:ext uri="{96DAC541-7B7A-43D3-8B79-37D633B846F1}">
+                <asvg:svgBlip xmlns:asvg="http://schemas.microsoft.com/office/drawing/2016/SVG/main" r:embed="rId6"/>
+              </a:ext>
+            </a:extLst>
+          </a:blip>
+          <a:stretch>
+            <a:fillRect/>
+          </a:stretch>
+        </p:blipFill>
+        <p:spPr>
+          <a:xfrm>
+            <a:off x="5638800" y="3107676"/>
+            <a:ext cx="1745673" cy="1745673"/>
+          </a:xfrm>
+          <a:prstGeom prst="rect">
+            <a:avLst/>
+          </a:prstGeom>
+        </p:spPr>
+      </p:pic>
+      <p:pic>
+        <p:nvPicPr>
+          <p:cNvPr id="11" name="Grafik 10" descr="Kaffee mit einfarbiger Füllung">
+            <a:extLst>
+              <a:ext uri="{FF2B5EF4-FFF2-40B4-BE49-F238E27FC236}">
+                <a16:creationId xmlns:a16="http://schemas.microsoft.com/office/drawing/2014/main" id="{B2FF02C6-5F90-7C49-8FB7-4D8FCCE30638}"/>
+              </a:ext>
+            </a:extLst>
+          </p:cNvPr>
+          <p:cNvPicPr>
+            <a:picLocks noChangeAspect="1"/>
+          </p:cNvPicPr>
+          <p:nvPr/>
+        </p:nvPicPr>
+        <p:blipFill>
+          <a:blip r:embed="rId7">
+            <a:extLst>
+              <a:ext uri="{96DAC541-7B7A-43D3-8B79-37D633B846F1}">
+                <asvg:svgBlip xmlns:asvg="http://schemas.microsoft.com/office/drawing/2016/SVG/main" r:embed="rId8"/>
+              </a:ext>
+            </a:extLst>
+          </a:blip>
+          <a:stretch>
+            <a:fillRect/>
+          </a:stretch>
+        </p:blipFill>
+        <p:spPr>
+          <a:xfrm>
+            <a:off x="7301347" y="3034145"/>
+            <a:ext cx="1745672" cy="1745672"/>
+          </a:xfrm>
+          <a:prstGeom prst="rect">
+            <a:avLst/>
+          </a:prstGeom>
+        </p:spPr>
+      </p:pic>
+      <p:pic>
+        <p:nvPicPr>
+          <p:cNvPr id="12" name="Grafik 11" descr="Flasche mit einfarbiger Füllung">
+            <a:extLst>
+              <a:ext uri="{FF2B5EF4-FFF2-40B4-BE49-F238E27FC236}">
+                <a16:creationId xmlns:a16="http://schemas.microsoft.com/office/drawing/2014/main" id="{5F0CED33-0E61-D649-ACB7-0C25A3B72DE6}"/>
+              </a:ext>
+            </a:extLst>
+          </p:cNvPr>
+          <p:cNvPicPr>
+            <a:picLocks noChangeAspect="1"/>
+          </p:cNvPicPr>
+          <p:nvPr/>
+        </p:nvPicPr>
+        <p:blipFill>
+          <a:blip r:embed="rId5">
+            <a:extLst>
+              <a:ext uri="{96DAC541-7B7A-43D3-8B79-37D633B846F1}">
+                <asvg:svgBlip xmlns:asvg="http://schemas.microsoft.com/office/drawing/2016/SVG/main" r:embed="rId6"/>
+              </a:ext>
+            </a:extLst>
+          </a:blip>
+          <a:stretch>
+            <a:fillRect/>
+          </a:stretch>
+        </p:blipFill>
+        <p:spPr>
+          <a:xfrm>
+            <a:off x="6497782" y="1580753"/>
+            <a:ext cx="1745673" cy="1745673"/>
+          </a:xfrm>
+          <a:prstGeom prst="rect">
+            <a:avLst/>
+          </a:prstGeom>
+        </p:spPr>
+      </p:pic>
+      <p:pic>
+        <p:nvPicPr>
+          <p:cNvPr id="13" name="Grafik 12" descr="Kaffee mit einfarbiger Füllung">
+            <a:extLst>
+              <a:ext uri="{FF2B5EF4-FFF2-40B4-BE49-F238E27FC236}">
+                <a16:creationId xmlns:a16="http://schemas.microsoft.com/office/drawing/2014/main" id="{C4663941-8982-6347-8B64-E62DB881DDBD}"/>
+              </a:ext>
+            </a:extLst>
+          </p:cNvPr>
+          <p:cNvPicPr>
+            <a:picLocks noChangeAspect="1"/>
+          </p:cNvPicPr>
+          <p:nvPr/>
+        </p:nvPicPr>
+        <p:blipFill>
+          <a:blip r:embed="rId7">
+            <a:extLst>
+              <a:ext uri="{96DAC541-7B7A-43D3-8B79-37D633B846F1}">
+                <asvg:svgBlip xmlns:asvg="http://schemas.microsoft.com/office/drawing/2016/SVG/main" r:embed="rId8"/>
+              </a:ext>
+            </a:extLst>
+          </a:blip>
+          <a:stretch>
+            <a:fillRect/>
+          </a:stretch>
+        </p:blipFill>
+        <p:spPr>
+          <a:xfrm>
+            <a:off x="8534403" y="1580753"/>
+            <a:ext cx="1745672" cy="1745672"/>
+          </a:xfrm>
+          <a:prstGeom prst="rect">
+            <a:avLst/>
+          </a:prstGeom>
+        </p:spPr>
+      </p:pic>
+      <p:pic>
+        <p:nvPicPr>
+          <p:cNvPr id="14" name="Grafik 13" descr="Fragezeichen mit einfarbiger Füllung">
+            <a:extLst>
+              <a:ext uri="{FF2B5EF4-FFF2-40B4-BE49-F238E27FC236}">
+                <a16:creationId xmlns:a16="http://schemas.microsoft.com/office/drawing/2014/main" id="{376A232C-4C36-C646-A410-41DBABFACAC8}"/>
+              </a:ext>
+            </a:extLst>
+          </p:cNvPr>
+          <p:cNvPicPr>
+            <a:picLocks noChangeAspect="1"/>
+          </p:cNvPicPr>
+          <p:nvPr/>
+        </p:nvPicPr>
+        <p:blipFill>
+          <a:blip r:embed="rId9">
+            <a:extLst>
+              <a:ext uri="{96DAC541-7B7A-43D3-8B79-37D633B846F1}">
+                <asvg:svgBlip xmlns:asvg="http://schemas.microsoft.com/office/drawing/2016/SVG/main" r:embed="rId10"/>
+              </a:ext>
+            </a:extLst>
+          </a:blip>
+          <a:stretch>
+            <a:fillRect/>
+          </a:stretch>
+        </p:blipFill>
+        <p:spPr>
+          <a:xfrm>
+            <a:off x="4225635" y="2071254"/>
+            <a:ext cx="1925782" cy="1925782"/>
+          </a:xfrm>
+          <a:prstGeom prst="rect">
+            <a:avLst/>
+          </a:prstGeom>
+        </p:spPr>
+      </p:pic>
+    </p:spTree>
+    <p:extLst>
+      <p:ext uri="{BB962C8B-B14F-4D97-AF65-F5344CB8AC3E}">
+        <p14:creationId xmlns:p14="http://schemas.microsoft.com/office/powerpoint/2010/main" val="1841952403"/>
+      </p:ext>
+    </p:extLst>
+  </p:cSld>
+  <p:clrMapOvr>
+    <a:masterClrMapping/>
+  </p:clrMapOvr>
+</p:sld>
+</file>
+
+<file path=ppt/slides/slide13.xml><?xml version="1.0" encoding="utf-8"?>
+<p:sld xmlns:a="http://schemas.openxmlformats.org/drawingml/2006/main" xmlns:r="http://schemas.openxmlformats.org/officeDocument/2006/relationships" xmlns:p="http://schemas.openxmlformats.org/presentationml/2006/main">
+  <p:cSld>
+    <p:spTree>
+      <p:nvGrpSpPr>
+        <p:cNvPr id="1" name=""/>
+        <p:cNvGrpSpPr/>
+        <p:nvPr/>
+      </p:nvGrpSpPr>
+      <p:grpSpPr>
+        <a:xfrm>
+          <a:off x="0" y="0"/>
+          <a:ext cx="0" cy="0"/>
+          <a:chOff x="0" y="0"/>
+          <a:chExt cx="0" cy="0"/>
+        </a:xfrm>
+      </p:grpSpPr>
+      <p:sp>
+        <p:nvSpPr>
+          <p:cNvPr id="2" name="Titel 1">
+            <a:extLst>
+              <a:ext uri="{FF2B5EF4-FFF2-40B4-BE49-F238E27FC236}">
+                <a16:creationId xmlns:a16="http://schemas.microsoft.com/office/drawing/2014/main" id="{DC10472C-A722-2447-B559-3E2A15526694}"/>
+              </a:ext>
+            </a:extLst>
+          </p:cNvPr>
+          <p:cNvSpPr>
+            <a:spLocks noGrp="1"/>
+          </p:cNvSpPr>
+          <p:nvPr>
+            <p:ph type="title"/>
+          </p:nvPr>
+        </p:nvSpPr>
+        <p:spPr/>
+        <p:txBody>
+          <a:bodyPr/>
+          <a:lstStyle/>
+          <a:p>
+            <a:r>
+              <a:rPr lang="de-DE" dirty="0"/>
+              <a:t>Tabelle bearbeiten</a:t>
+            </a:r>
+          </a:p>
+        </p:txBody>
+      </p:sp>
+      <p:sp>
+        <p:nvSpPr>
+          <p:cNvPr id="3" name="Inhaltsplatzhalter 2">
+            <a:extLst>
+              <a:ext uri="{FF2B5EF4-FFF2-40B4-BE49-F238E27FC236}">
+                <a16:creationId xmlns:a16="http://schemas.microsoft.com/office/drawing/2014/main" id="{B4CE9685-B6BD-E54F-9949-8301147A8987}"/>
+              </a:ext>
+            </a:extLst>
+          </p:cNvPr>
+          <p:cNvSpPr>
+            <a:spLocks noGrp="1"/>
+          </p:cNvSpPr>
+          <p:nvPr>
+            <p:ph sz="half" idx="1"/>
+          </p:nvPr>
+        </p:nvSpPr>
+        <p:spPr/>
+        <p:txBody>
+          <a:bodyPr/>
+          <a:lstStyle/>
+          <a:p>
+            <a:pPr marL="0" indent="0">
+              <a:buNone/>
+            </a:pPr>
+            <a:r>
+              <a:rPr lang="de-DE" i="1" dirty="0"/>
+              <a:t>Warum gewünscht: </a:t>
+            </a:r>
+          </a:p>
+          <a:p>
+            <a:pPr marL="0" indent="0">
+              <a:buNone/>
+            </a:pPr>
+            <a:endParaRPr lang="de-DE" dirty="0"/>
+          </a:p>
+          <a:p>
+            <a:r>
+              <a:rPr lang="de-DE" dirty="0"/>
+              <a:t>Zeilen &amp; Spalten hinzufügen</a:t>
+            </a:r>
+          </a:p>
+          <a:p>
+            <a:r>
+              <a:rPr lang="de-DE" dirty="0"/>
+              <a:t>Neue Ideen</a:t>
+            </a:r>
+          </a:p>
+          <a:p>
+            <a:r>
+              <a:rPr lang="de-DE" dirty="0"/>
+              <a:t>Korrekturmöglichkeiten</a:t>
+            </a:r>
+          </a:p>
+        </p:txBody>
+      </p:sp>
+      <p:sp>
+        <p:nvSpPr>
+          <p:cNvPr id="4" name="Inhaltsplatzhalter 3">
+            <a:extLst>
+              <a:ext uri="{FF2B5EF4-FFF2-40B4-BE49-F238E27FC236}">
+                <a16:creationId xmlns:a16="http://schemas.microsoft.com/office/drawing/2014/main" id="{1825F776-8941-3A45-808C-5F30340B4C02}"/>
+              </a:ext>
+            </a:extLst>
+          </p:cNvPr>
+          <p:cNvSpPr>
+            <a:spLocks noGrp="1"/>
+          </p:cNvSpPr>
+          <p:nvPr>
+            <p:ph sz="half" idx="2"/>
+          </p:nvPr>
+        </p:nvSpPr>
+        <p:spPr/>
+        <p:txBody>
+          <a:bodyPr/>
+          <a:lstStyle/>
+          <a:p>
+            <a:pPr marL="0" indent="0">
+              <a:buNone/>
+            </a:pPr>
+            <a:r>
+              <a:rPr lang="de-DE" i="1" dirty="0"/>
+              <a:t>Warum Wunsch:</a:t>
+            </a:r>
+          </a:p>
+          <a:p>
+            <a:pPr marL="0" indent="0">
+              <a:buNone/>
+            </a:pPr>
+            <a:endParaRPr lang="de-DE" dirty="0"/>
+          </a:p>
+          <a:p>
+            <a:r>
+              <a:rPr lang="de-DE" dirty="0"/>
+              <a:t>Hohes Konfliktpotential</a:t>
+            </a:r>
+          </a:p>
+          <a:p>
+            <a:endParaRPr lang="de-DE" dirty="0"/>
+          </a:p>
+        </p:txBody>
+      </p:sp>
+      <p:sp>
+        <p:nvSpPr>
+          <p:cNvPr id="5" name="Datumsplatzhalter 4">
+            <a:extLst>
+              <a:ext uri="{FF2B5EF4-FFF2-40B4-BE49-F238E27FC236}">
+                <a16:creationId xmlns:a16="http://schemas.microsoft.com/office/drawing/2014/main" id="{D8780823-4011-B446-8F50-A7EEA649C23D}"/>
+              </a:ext>
+            </a:extLst>
+          </p:cNvPr>
+          <p:cNvSpPr>
+            <a:spLocks noGrp="1"/>
+          </p:cNvSpPr>
+          <p:nvPr>
+            <p:ph type="dt" sz="half" idx="10"/>
+          </p:nvPr>
+        </p:nvSpPr>
+        <p:spPr/>
+        <p:txBody>
+          <a:bodyPr/>
+          <a:lstStyle/>
+          <a:p>
+            <a:r>
+              <a:rPr lang="de-DE"/>
+              <a:t>03.12.21</a:t>
+            </a:r>
+          </a:p>
+        </p:txBody>
+      </p:sp>
+      <p:sp>
+        <p:nvSpPr>
+          <p:cNvPr id="6" name="Foliennummernplatzhalter 5">
+            <a:extLst>
+              <a:ext uri="{FF2B5EF4-FFF2-40B4-BE49-F238E27FC236}">
+                <a16:creationId xmlns:a16="http://schemas.microsoft.com/office/drawing/2014/main" id="{B5EE29CD-5AC9-344B-8B73-C8F68BF714AA}"/>
+              </a:ext>
+            </a:extLst>
+          </p:cNvPr>
+          <p:cNvSpPr>
+            <a:spLocks noGrp="1"/>
+          </p:cNvSpPr>
+          <p:nvPr>
+            <p:ph type="sldNum" sz="quarter" idx="12"/>
+          </p:nvPr>
+        </p:nvSpPr>
+        <p:spPr/>
+        <p:txBody>
+          <a:bodyPr/>
+          <a:lstStyle/>
+          <a:p>
+            <a:fld id="{C1951030-1712-A844-813B-C453E8FB818E}" type="slidenum">
+              <a:rPr lang="de-DE" smtClean="0"/>
+              <a:t>13</a:t>
+            </a:fld>
+            <a:endParaRPr lang="de-DE"/>
+          </a:p>
+        </p:txBody>
+      </p:sp>
+    </p:spTree>
+    <p:extLst>
+      <p:ext uri="{BB962C8B-B14F-4D97-AF65-F5344CB8AC3E}">
+        <p14:creationId xmlns:p14="http://schemas.microsoft.com/office/powerpoint/2010/main" val="4009044167"/>
       </p:ext>
     </p:extLst>
   </p:cSld>
@@ -11513,7 +11507,7 @@
           <p:cNvPr id="2" name="Titel 1">
             <a:extLst>
               <a:ext uri="{FF2B5EF4-FFF2-40B4-BE49-F238E27FC236}">
-                <a16:creationId xmlns:a16="http://schemas.microsoft.com/office/drawing/2014/main" id="{42DB923A-A1B1-8648-BD87-4A32709229CC}"/>
+                <a16:creationId xmlns:a16="http://schemas.microsoft.com/office/drawing/2014/main" id="{FEBB81A3-B09F-9E4F-99C9-B6FA29532151}"/>
               </a:ext>
             </a:extLst>
           </p:cNvPr>
@@ -11531,7 +11525,7 @@
           <a:p>
             <a:r>
               <a:rPr lang="de-DE" dirty="0"/>
-              <a:t>Hochladen von Templates</a:t>
+              <a:t>Parametrisierung</a:t>
             </a:r>
           </a:p>
         </p:txBody>
@@ -11541,7 +11535,7 @@
           <p:cNvPr id="4" name="Datumsplatzhalter 3">
             <a:extLst>
               <a:ext uri="{FF2B5EF4-FFF2-40B4-BE49-F238E27FC236}">
-                <a16:creationId xmlns:a16="http://schemas.microsoft.com/office/drawing/2014/main" id="{792E0081-E7AC-E740-B2D3-182E8F042CCE}"/>
+                <a16:creationId xmlns:a16="http://schemas.microsoft.com/office/drawing/2014/main" id="{37E5153A-0133-6446-8E9C-1E524EC4F28E}"/>
               </a:ext>
             </a:extLst>
           </p:cNvPr>
@@ -11569,7 +11563,7 @@
           <p:cNvPr id="5" name="Foliennummernplatzhalter 4">
             <a:extLst>
               <a:ext uri="{FF2B5EF4-FFF2-40B4-BE49-F238E27FC236}">
-                <a16:creationId xmlns:a16="http://schemas.microsoft.com/office/drawing/2014/main" id="{1DDFCF15-B3DF-E844-B016-FD1566765C8D}"/>
+                <a16:creationId xmlns:a16="http://schemas.microsoft.com/office/drawing/2014/main" id="{83177281-6097-E248-B00D-0814B4886B8D}"/>
               </a:ext>
             </a:extLst>
           </p:cNvPr>
@@ -11598,7 +11592,7 @@
           <p:cNvPr id="6" name="Inhaltsplatzhalter 2">
             <a:extLst>
               <a:ext uri="{FF2B5EF4-FFF2-40B4-BE49-F238E27FC236}">
-                <a16:creationId xmlns:a16="http://schemas.microsoft.com/office/drawing/2014/main" id="{64F14DAB-9492-48F6-9352-749778F15D15}"/>
+                <a16:creationId xmlns:a16="http://schemas.microsoft.com/office/drawing/2014/main" id="{8A76C604-608B-4DA8-92CD-CD20B2C59395}"/>
               </a:ext>
             </a:extLst>
           </p:cNvPr>
@@ -11804,13 +11798,19 @@
           <a:p>
             <a:r>
               <a:rPr lang="de-DE" dirty="0"/>
-              <a:t>Inspiration für Projekte von anderen Nutzern</a:t>
+              <a:t>Neue Graphen</a:t>
             </a:r>
           </a:p>
           <a:p>
             <a:r>
               <a:rPr lang="de-DE" dirty="0"/>
-              <a:t>Einfache Möglichkeit, aufwendigere Projekte zu starten</a:t>
+              <a:t>Neue Datentypen</a:t>
+            </a:r>
+          </a:p>
+          <a:p>
+            <a:r>
+              <a:rPr lang="de-DE" dirty="0"/>
+              <a:t>Andere Verwendung der existierende Graphen</a:t>
             </a:r>
           </a:p>
         </p:txBody>
@@ -11820,7 +11820,7 @@
           <p:cNvPr id="7" name="Inhaltsplatzhalter 3">
             <a:extLst>
               <a:ext uri="{FF2B5EF4-FFF2-40B4-BE49-F238E27FC236}">
-                <a16:creationId xmlns:a16="http://schemas.microsoft.com/office/drawing/2014/main" id="{52C3776E-0D32-4519-8F17-3FCD3E951196}"/>
+                <a16:creationId xmlns:a16="http://schemas.microsoft.com/office/drawing/2014/main" id="{2809ED00-FEDA-4690-A59A-884CFB5FDA2C}"/>
               </a:ext>
             </a:extLst>
           </p:cNvPr>
@@ -12024,13 +12024,13 @@
           <a:p>
             <a:r>
               <a:rPr lang="de-DE" dirty="0"/>
-              <a:t>Deutlich schwieriger einschätzbare Serverauslastung</a:t>
+              <a:t>Bei Basisdatentypen /-graphen nicht notwendig</a:t>
             </a:r>
           </a:p>
           <a:p>
             <a:r>
               <a:rPr lang="de-DE" dirty="0"/>
-              <a:t>Kein Mehrwert bei Basisdatentypen /-graphen</a:t>
+              <a:t>Teilweise aufwendige Checks notwendig</a:t>
             </a:r>
           </a:p>
           <a:p>
@@ -12041,7 +12041,7 @@
     </p:spTree>
     <p:extLst>
       <p:ext uri="{BB962C8B-B14F-4D97-AF65-F5344CB8AC3E}">
-        <p14:creationId xmlns:p14="http://schemas.microsoft.com/office/powerpoint/2010/main" val="2432425423"/>
+        <p14:creationId xmlns:p14="http://schemas.microsoft.com/office/powerpoint/2010/main" val="2401719195"/>
       </p:ext>
     </p:extLst>
   </p:cSld>
@@ -15872,7 +15872,7 @@
           <a:p>
             <a:r>
               <a:rPr lang="de-DE" dirty="0"/>
-              <a:t>Resultat für die Pflichtkriterien</a:t>
+              <a:t>Auswirkungen auf die Funktionalität</a:t>
             </a:r>
           </a:p>
         </p:txBody>

</xml_diff>